<commit_message>
Updated graphs in the poster.
</commit_message>
<xml_diff>
--- a/FlowQoS_poster.pptx
+++ b/FlowQoS_poster.pptx
@@ -209,7 +209,7 @@
             <a:fld id="{D508C3B9-C8C7-FF4B-A89F-C8ECF40039BD}" type="datetimeFigureOut">
               <a:rPr lang="en-US" smtClean="0"/>
               <a:pPr/>
-              <a:t>12/4/2015</a:t>
+              <a:t>12/5/2015</a:t>
             </a:fld>
             <a:endParaRPr lang="en-US" dirty="0"/>
           </a:p>
@@ -749,7 +749,7 @@
             <a:fld id="{57B7EB2E-A371-994C-A83F-1C5C49F53A45}" type="datetimeFigureOut">
               <a:rPr lang="en-US" smtClean="0"/>
               <a:pPr/>
-              <a:t>12/4/2015</a:t>
+              <a:t>12/5/2015</a:t>
             </a:fld>
             <a:endParaRPr lang="en-US" dirty="0"/>
           </a:p>
@@ -916,7 +916,7 @@
             <a:fld id="{57B7EB2E-A371-994C-A83F-1C5C49F53A45}" type="datetimeFigureOut">
               <a:rPr lang="en-US" smtClean="0"/>
               <a:pPr/>
-              <a:t>12/4/2015</a:t>
+              <a:t>12/5/2015</a:t>
             </a:fld>
             <a:endParaRPr lang="en-US" dirty="0"/>
           </a:p>
@@ -1093,7 +1093,7 @@
             <a:fld id="{57B7EB2E-A371-994C-A83F-1C5C49F53A45}" type="datetimeFigureOut">
               <a:rPr lang="en-US" smtClean="0"/>
               <a:pPr/>
-              <a:t>12/4/2015</a:t>
+              <a:t>12/5/2015</a:t>
             </a:fld>
             <a:endParaRPr lang="en-US" dirty="0"/>
           </a:p>
@@ -1260,7 +1260,7 @@
             <a:fld id="{57B7EB2E-A371-994C-A83F-1C5C49F53A45}" type="datetimeFigureOut">
               <a:rPr lang="en-US" smtClean="0"/>
               <a:pPr/>
-              <a:t>12/4/2015</a:t>
+              <a:t>12/5/2015</a:t>
             </a:fld>
             <a:endParaRPr lang="en-US" dirty="0"/>
           </a:p>
@@ -1503,7 +1503,7 @@
             <a:fld id="{57B7EB2E-A371-994C-A83F-1C5C49F53A45}" type="datetimeFigureOut">
               <a:rPr lang="en-US" smtClean="0"/>
               <a:pPr/>
-              <a:t>12/4/2015</a:t>
+              <a:t>12/5/2015</a:t>
             </a:fld>
             <a:endParaRPr lang="en-US" dirty="0"/>
           </a:p>
@@ -1788,7 +1788,7 @@
             <a:fld id="{57B7EB2E-A371-994C-A83F-1C5C49F53A45}" type="datetimeFigureOut">
               <a:rPr lang="en-US" smtClean="0"/>
               <a:pPr/>
-              <a:t>12/4/2015</a:t>
+              <a:t>12/5/2015</a:t>
             </a:fld>
             <a:endParaRPr lang="en-US" dirty="0"/>
           </a:p>
@@ -2212,7 +2212,7 @@
             <a:fld id="{57B7EB2E-A371-994C-A83F-1C5C49F53A45}" type="datetimeFigureOut">
               <a:rPr lang="en-US" smtClean="0"/>
               <a:pPr/>
-              <a:t>12/4/2015</a:t>
+              <a:t>12/5/2015</a:t>
             </a:fld>
             <a:endParaRPr lang="en-US" dirty="0"/>
           </a:p>
@@ -2327,7 +2327,7 @@
             <a:fld id="{57B7EB2E-A371-994C-A83F-1C5C49F53A45}" type="datetimeFigureOut">
               <a:rPr lang="en-US" smtClean="0"/>
               <a:pPr/>
-              <a:t>12/4/2015</a:t>
+              <a:t>12/5/2015</a:t>
             </a:fld>
             <a:endParaRPr lang="en-US" dirty="0"/>
           </a:p>
@@ -2419,7 +2419,7 @@
             <a:fld id="{57B7EB2E-A371-994C-A83F-1C5C49F53A45}" type="datetimeFigureOut">
               <a:rPr lang="en-US" smtClean="0"/>
               <a:pPr/>
-              <a:t>12/4/2015</a:t>
+              <a:t>12/5/2015</a:t>
             </a:fld>
             <a:endParaRPr lang="en-US" dirty="0"/>
           </a:p>
@@ -2693,7 +2693,7 @@
             <a:fld id="{57B7EB2E-A371-994C-A83F-1C5C49F53A45}" type="datetimeFigureOut">
               <a:rPr lang="en-US" smtClean="0"/>
               <a:pPr/>
-              <a:t>12/4/2015</a:t>
+              <a:t>12/5/2015</a:t>
             </a:fld>
             <a:endParaRPr lang="en-US" dirty="0"/>
           </a:p>
@@ -2943,7 +2943,7 @@
             <a:fld id="{57B7EB2E-A371-994C-A83F-1C5C49F53A45}" type="datetimeFigureOut">
               <a:rPr lang="en-US" smtClean="0"/>
               <a:pPr/>
-              <a:t>12/4/2015</a:t>
+              <a:t>12/5/2015</a:t>
             </a:fld>
             <a:endParaRPr lang="en-US" dirty="0"/>
           </a:p>
@@ -3153,7 +3153,7 @@
             <a:fld id="{57B7EB2E-A371-994C-A83F-1C5C49F53A45}" type="datetimeFigureOut">
               <a:rPr lang="en-US" smtClean="0"/>
               <a:pPr/>
-              <a:t>12/4/2015</a:t>
+              <a:t>12/5/2015</a:t>
             </a:fld>
             <a:endParaRPr lang="en-US" dirty="0"/>
           </a:p>
@@ -3524,6 +3524,63 @@
           <a:chExt cx="0" cy="0"/>
         </a:xfrm>
       </p:grpSpPr>
+      <p:graphicFrame>
+        <p:nvGraphicFramePr>
+          <p:cNvPr id="23" name="Object 22"/>
+          <p:cNvGraphicFramePr>
+            <a:graphicFrameLocks noChangeAspect="1"/>
+          </p:cNvGraphicFramePr>
+          <p:nvPr>
+            <p:extLst>
+              <p:ext uri="{D42A27DB-BD31-4B8C-83A1-F6EECF244321}">
+                <p14:modId xmlns:p14="http://schemas.microsoft.com/office/powerpoint/2010/main" val="3521223606"/>
+              </p:ext>
+            </p:extLst>
+          </p:nvPr>
+        </p:nvGraphicFramePr>
+        <p:xfrm>
+          <a:off x="32052085" y="11043313"/>
+          <a:ext cx="9496961" cy="6760353"/>
+        </p:xfrm>
+        <a:graphic>
+          <a:graphicData uri="http://schemas.openxmlformats.org/presentationml/2006/ole">
+            <mc:AlternateContent xmlns:mc="http://schemas.openxmlformats.org/markup-compatibility/2006">
+              <mc:Choice xmlns:v="urn:schemas-microsoft-com:vml" Requires="v">
+                <p:oleObj spid="_x0000_s2054" name="Acrobat Document" r:id="rId4" imgW="6034934" imgH="4663299" progId="AcroExch.Document.DC">
+                  <p:embed/>
+                </p:oleObj>
+              </mc:Choice>
+              <mc:Fallback>
+                <p:oleObj name="Acrobat Document" r:id="rId4" imgW="6034934" imgH="4663299" progId="AcroExch.Document.DC">
+                  <p:embed/>
+                  <p:pic>
+                    <p:nvPicPr>
+                      <p:cNvPr id="0" name=""/>
+                      <p:cNvPicPr/>
+                      <p:nvPr/>
+                    </p:nvPicPr>
+                    <p:blipFill>
+                      <a:blip r:embed="rId5"/>
+                      <a:stretch>
+                        <a:fillRect/>
+                      </a:stretch>
+                    </p:blipFill>
+                    <p:spPr>
+                      <a:xfrm>
+                        <a:off x="32052085" y="11043313"/>
+                        <a:ext cx="9496961" cy="6760353"/>
+                      </a:xfrm>
+                      <a:prstGeom prst="rect">
+                        <a:avLst/>
+                      </a:prstGeom>
+                    </p:spPr>
+                  </p:pic>
+                </p:oleObj>
+              </mc:Fallback>
+            </mc:AlternateContent>
+          </a:graphicData>
+        </a:graphic>
+      </p:graphicFrame>
       <p:sp>
         <p:nvSpPr>
           <p:cNvPr id="24" name="Rectangle 23"/>
@@ -3566,7 +3623,7 @@
           <p:nvPr/>
         </p:nvPicPr>
         <p:blipFill>
-          <a:blip r:embed="rId4"/>
+          <a:blip r:embed="rId6"/>
           <a:stretch>
             <a:fillRect/>
           </a:stretch>
@@ -3900,10 +3957,10 @@
           </a:lstStyle>
           <a:p>
             <a:r>
-              <a:rPr lang="en-US" dirty="0" smtClean="0"/>
+              <a:rPr lang="en-US" sz="4300" dirty="0" smtClean="0"/>
               <a:t>Efficient Bandwidth Utilization</a:t>
             </a:r>
-            <a:endParaRPr lang="en-US" dirty="0"/>
+            <a:endParaRPr lang="en-US" sz="4300" dirty="0"/>
           </a:p>
         </p:txBody>
       </p:sp>
@@ -3959,8 +4016,8 @@
         </p:nvSpPr>
         <p:spPr>
           <a:xfrm>
-            <a:off x="433807" y="3877525"/>
-            <a:ext cx="12139268" cy="13221102"/>
+            <a:off x="433806" y="3792244"/>
+            <a:ext cx="13714724" cy="13306383"/>
           </a:xfrm>
           <a:prstGeom prst="rect">
             <a:avLst/>
@@ -4000,8 +4057,8 @@
         </p:nvSpPr>
         <p:spPr>
           <a:xfrm>
-            <a:off x="635146" y="4029294"/>
-            <a:ext cx="11808644" cy="828000"/>
+            <a:off x="635147" y="4036633"/>
+            <a:ext cx="13258094" cy="653113"/>
           </a:xfrm>
           <a:prstGeom prst="rect">
             <a:avLst/>
@@ -4013,14 +4070,14 @@
           </a:solidFill>
         </p:spPr>
         <p:txBody>
-          <a:bodyPr wrap="none" lIns="127000" tIns="127000" rIns="127000" bIns="127000" rtlCol="0">
-            <a:normAutofit fontScale="77500" lnSpcReduction="20000"/>
+          <a:bodyPr wrap="none" lIns="127000" tIns="127000" rIns="127000" bIns="127000" rtlCol="0" anchor="ctr">
+            <a:noAutofit/>
           </a:bodyPr>
           <a:lstStyle/>
           <a:p>
             <a:pPr algn="ctr"/>
             <a:r>
-              <a:rPr lang="en-US" altLang="zh-CN" sz="5600" dirty="0" smtClean="0">
+              <a:rPr lang="en-US" altLang="zh-CN" sz="3100" dirty="0">
                 <a:solidFill>
                   <a:schemeClr val="bg1"/>
                 </a:solidFill>
@@ -4029,7 +4086,7 @@
               </a:rPr>
               <a:t>Motivation</a:t>
             </a:r>
-            <a:endParaRPr lang="en-US" sz="5600" dirty="0">
+            <a:endParaRPr lang="en-US" sz="3100" dirty="0">
               <a:solidFill>
                 <a:schemeClr val="bg1"/>
               </a:solidFill>
@@ -4047,8 +4104,8 @@
         </p:nvSpPr>
         <p:spPr>
           <a:xfrm>
-            <a:off x="595388" y="11042747"/>
-            <a:ext cx="11808644" cy="828000"/>
+            <a:off x="662121" y="7725197"/>
+            <a:ext cx="13258094" cy="686552"/>
           </a:xfrm>
           <a:prstGeom prst="rect">
             <a:avLst/>
@@ -4061,7 +4118,7 @@
         </p:spPr>
         <p:txBody>
           <a:bodyPr wrap="none" lIns="127000" tIns="127000" rIns="127000" bIns="127000" rtlCol="0">
-            <a:normAutofit fontScale="77500" lnSpcReduction="20000"/>
+            <a:noAutofit/>
           </a:bodyPr>
           <a:lstStyle>
             <a:defPPr>
@@ -4079,10 +4136,10 @@
           </a:lstStyle>
           <a:p>
             <a:r>
-              <a:rPr lang="en-US" altLang="zh-CN" dirty="0"/>
+              <a:rPr lang="en-US" altLang="zh-CN" sz="3100" dirty="0"/>
               <a:t>Solution</a:t>
             </a:r>
-            <a:endParaRPr lang="en-US" dirty="0"/>
+            <a:endParaRPr lang="en-US" sz="3100" dirty="0"/>
           </a:p>
         </p:txBody>
       </p:sp>
@@ -4094,8 +4151,8 @@
         </p:nvSpPr>
         <p:spPr>
           <a:xfrm>
-            <a:off x="635146" y="5092918"/>
-            <a:ext cx="11729129" cy="5293757"/>
+            <a:off x="635146" y="4761135"/>
+            <a:ext cx="13258094" cy="2816156"/>
           </a:xfrm>
           <a:prstGeom prst="rect">
             <a:avLst/>
@@ -4108,289 +4165,62 @@
           </a:bodyPr>
           <a:lstStyle/>
           <a:p>
-            <a:pPr>
+            <a:pPr marL="463550" indent="-463550" algn="just">
               <a:spcAft>
-                <a:spcPts val="1800"/>
+                <a:spcPts val="600"/>
               </a:spcAft>
+              <a:buFont typeface="Arial" panose="020B0604020202020204" pitchFamily="34" charset="0"/>
+              <a:buChar char="•"/>
             </a:pPr>
             <a:r>
-              <a:rPr lang="en-US" sz="4400" dirty="0" smtClean="0">
-                <a:ea typeface="Times New Roman" charset="0"/>
-                <a:cs typeface="Times New Roman" charset="0"/>
-              </a:rPr>
-              <a:t>•</a:t>
-            </a:r>
-            <a:r>
-              <a:rPr lang="zh-CN" altLang="en-US" sz="4400" dirty="0" smtClean="0">
-                <a:ea typeface="Times New Roman" charset="0"/>
-                <a:cs typeface="Times New Roman" charset="0"/>
-              </a:rPr>
-              <a:t> </a:t>
-            </a:r>
-            <a:r>
-              <a:rPr lang="en-US" sz="4400" dirty="0" smtClean="0">
-                <a:ea typeface="Times New Roman" charset="0"/>
-                <a:cs typeface="Times New Roman" charset="0"/>
-              </a:rPr>
-              <a:t>Traffic from one application might not share the same characteristics as the traffic </a:t>
-            </a:r>
-            <a:r>
-              <a:rPr lang="en-US" sz="4400" dirty="0" smtClean="0">
-                <a:ea typeface="Times New Roman" charset="0"/>
-                <a:cs typeface="Times New Roman" charset="0"/>
-              </a:rPr>
-              <a:t>from another.</a:t>
-            </a:r>
-            <a:endParaRPr lang="zh-CN" altLang="en-US" sz="4400" dirty="0" smtClean="0">
+              <a:rPr lang="en-US" sz="4300" dirty="0" smtClean="0">
+                <a:ea typeface="Times New Roman" charset="0"/>
+                <a:cs typeface="Times New Roman" charset="0"/>
+              </a:rPr>
+              <a:t>Traffic from one application might not share the same characteristics as the traffic from another.</a:t>
+            </a:r>
+            <a:endParaRPr lang="zh-CN" altLang="en-US" sz="4300" dirty="0" smtClean="0">
               <a:ea typeface="Times New Roman" charset="0"/>
               <a:cs typeface="Times New Roman" charset="0"/>
             </a:endParaRPr>
           </a:p>
           <a:p>
-            <a:pPr>
+            <a:pPr marL="463550" indent="-463550" algn="just">
               <a:spcAft>
-                <a:spcPts val="1800"/>
+                <a:spcPts val="600"/>
               </a:spcAft>
+              <a:buFont typeface="Arial" panose="020B0604020202020204" pitchFamily="34" charset="0"/>
+              <a:buChar char="•"/>
             </a:pPr>
             <a:r>
-              <a:rPr lang="en-US" sz="4400" dirty="0" smtClean="0">
-                <a:ea typeface="Times New Roman" charset="0"/>
-                <a:cs typeface="Times New Roman" charset="0"/>
-              </a:rPr>
-              <a:t>•</a:t>
-            </a:r>
-            <a:r>
-              <a:rPr lang="en-US" sz="4400" dirty="0">
-                <a:ea typeface="Times New Roman" charset="0"/>
-                <a:cs typeface="Times New Roman" charset="0"/>
-              </a:rPr>
-              <a:t> </a:t>
-            </a:r>
-            <a:r>
-              <a:rPr lang="en-US" altLang="zh-CN" sz="4400" dirty="0" smtClean="0">
-                <a:ea typeface="Times New Roman" charset="0"/>
-                <a:cs typeface="Times New Roman" charset="0"/>
-              </a:rPr>
-              <a:t>Mechanisms</a:t>
-            </a:r>
-            <a:r>
-              <a:rPr lang="zh-CN" altLang="en-US" sz="4400" dirty="0" smtClean="0">
-                <a:ea typeface="Times New Roman" charset="0"/>
-                <a:cs typeface="Times New Roman" charset="0"/>
-              </a:rPr>
-              <a:t> </a:t>
-            </a:r>
-            <a:r>
-              <a:rPr lang="en-US" altLang="zh-CN" sz="4400" dirty="0" smtClean="0">
-                <a:ea typeface="Times New Roman" charset="0"/>
-                <a:cs typeface="Times New Roman" charset="0"/>
-              </a:rPr>
-              <a:t>to</a:t>
-            </a:r>
-            <a:r>
-              <a:rPr lang="zh-CN" altLang="en-US" sz="4400" dirty="0" smtClean="0">
-                <a:ea typeface="Times New Roman" charset="0"/>
-                <a:cs typeface="Times New Roman" charset="0"/>
-              </a:rPr>
-              <a:t> </a:t>
-            </a:r>
-            <a:r>
-              <a:rPr lang="en-US" altLang="zh-CN" sz="4400" dirty="0" smtClean="0">
-                <a:ea typeface="Times New Roman" charset="0"/>
-                <a:cs typeface="Times New Roman" charset="0"/>
-              </a:rPr>
-              <a:t>perform</a:t>
-            </a:r>
-            <a:r>
-              <a:rPr lang="zh-CN" altLang="en-US" sz="4400" dirty="0" smtClean="0">
-                <a:ea typeface="Times New Roman" charset="0"/>
-                <a:cs typeface="Times New Roman" charset="0"/>
-              </a:rPr>
-              <a:t> </a:t>
-            </a:r>
-            <a:r>
-              <a:rPr lang="en-US" altLang="zh-CN" sz="4400" dirty="0" err="1" smtClean="0">
+              <a:rPr lang="en-US" sz="4300" dirty="0">
+                <a:ea typeface="Times New Roman" charset="0"/>
+                <a:cs typeface="Times New Roman" charset="0"/>
+              </a:rPr>
+              <a:t>N</a:t>
+            </a:r>
+            <a:r>
+              <a:rPr lang="en-US" sz="4300" dirty="0" smtClean="0">
+                <a:ea typeface="Times New Roman" charset="0"/>
+                <a:cs typeface="Times New Roman" charset="0"/>
+              </a:rPr>
+              <a:t>etwork devices have DSCP-based </a:t>
+            </a:r>
+            <a:r>
+              <a:rPr lang="en-US" sz="4300" dirty="0" err="1" smtClean="0">
                 <a:ea typeface="Times New Roman" charset="0"/>
                 <a:cs typeface="Times New Roman" charset="0"/>
               </a:rPr>
               <a:t>QoS</a:t>
             </a:r>
             <a:r>
-              <a:rPr lang="zh-CN" altLang="en-US" sz="4400" dirty="0" smtClean="0">
-                <a:ea typeface="Times New Roman" charset="0"/>
-                <a:cs typeface="Times New Roman" charset="0"/>
-              </a:rPr>
-              <a:t> </a:t>
-            </a:r>
-            <a:r>
-              <a:rPr lang="en-US" altLang="zh-CN" sz="4400" dirty="0" smtClean="0">
-                <a:ea typeface="Times New Roman" charset="0"/>
-                <a:cs typeface="Times New Roman" charset="0"/>
-              </a:rPr>
-              <a:t>functions</a:t>
-            </a:r>
-            <a:r>
-              <a:rPr lang="zh-CN" altLang="en-US" sz="4400" dirty="0" smtClean="0">
-                <a:ea typeface="Times New Roman" charset="0"/>
-                <a:cs typeface="Times New Roman" charset="0"/>
-              </a:rPr>
-              <a:t> </a:t>
-            </a:r>
-            <a:r>
-              <a:rPr lang="en-US" altLang="zh-CN" sz="4400" dirty="0" smtClean="0">
-                <a:ea typeface="Times New Roman" charset="0"/>
-                <a:cs typeface="Times New Roman" charset="0"/>
-              </a:rPr>
-              <a:t>are</a:t>
-            </a:r>
-            <a:r>
-              <a:rPr lang="zh-CN" altLang="en-US" sz="4400" dirty="0" smtClean="0">
-                <a:ea typeface="Times New Roman" charset="0"/>
-                <a:cs typeface="Times New Roman" charset="0"/>
-              </a:rPr>
-              <a:t> </a:t>
-            </a:r>
-            <a:r>
-              <a:rPr lang="en-US" altLang="zh-CN" sz="4400" dirty="0" smtClean="0">
-                <a:ea typeface="Times New Roman" charset="0"/>
-                <a:cs typeface="Times New Roman" charset="0"/>
-              </a:rPr>
-              <a:t>not</a:t>
-            </a:r>
-            <a:r>
-              <a:rPr lang="zh-CN" altLang="en-US" sz="4400" dirty="0" smtClean="0">
-                <a:ea typeface="Times New Roman" charset="0"/>
-                <a:cs typeface="Times New Roman" charset="0"/>
-              </a:rPr>
-              <a:t> </a:t>
-            </a:r>
-            <a:r>
-              <a:rPr lang="en-US" altLang="zh-CN" sz="4400" dirty="0" smtClean="0">
-                <a:ea typeface="Times New Roman" charset="0"/>
-                <a:cs typeface="Times New Roman" charset="0"/>
-              </a:rPr>
-              <a:t>based</a:t>
-            </a:r>
-            <a:r>
-              <a:rPr lang="zh-CN" altLang="en-US" sz="4400" dirty="0" smtClean="0">
-                <a:ea typeface="Times New Roman" charset="0"/>
-                <a:cs typeface="Times New Roman" charset="0"/>
-              </a:rPr>
-              <a:t> </a:t>
-            </a:r>
-            <a:r>
-              <a:rPr lang="en-US" altLang="zh-CN" sz="4400" dirty="0" smtClean="0">
-                <a:ea typeface="Times New Roman" charset="0"/>
-                <a:cs typeface="Times New Roman" charset="0"/>
-              </a:rPr>
-              <a:t>on</a:t>
-            </a:r>
-            <a:r>
-              <a:rPr lang="zh-CN" altLang="en-US" sz="4400" dirty="0" smtClean="0">
-                <a:ea typeface="Times New Roman" charset="0"/>
-                <a:cs typeface="Times New Roman" charset="0"/>
-              </a:rPr>
-              <a:t> </a:t>
-            </a:r>
-            <a:r>
-              <a:rPr lang="en-US" altLang="zh-CN" sz="4400" dirty="0" smtClean="0">
-                <a:ea typeface="Times New Roman" charset="0"/>
-                <a:cs typeface="Times New Roman" charset="0"/>
-              </a:rPr>
-              <a:t>specific</a:t>
-            </a:r>
-            <a:r>
-              <a:rPr lang="zh-CN" altLang="en-US" sz="4400" dirty="0" smtClean="0">
-                <a:ea typeface="Times New Roman" charset="0"/>
-                <a:cs typeface="Times New Roman" charset="0"/>
-              </a:rPr>
-              <a:t> </a:t>
-            </a:r>
-            <a:r>
-              <a:rPr lang="en-US" altLang="zh-CN" sz="4400" dirty="0" smtClean="0">
-                <a:ea typeface="Times New Roman" charset="0"/>
-                <a:cs typeface="Times New Roman" charset="0"/>
-              </a:rPr>
-              <a:t>application,</a:t>
-            </a:r>
-            <a:r>
-              <a:rPr lang="zh-CN" altLang="en-US" sz="4400" dirty="0" smtClean="0">
-                <a:ea typeface="Times New Roman" charset="0"/>
-                <a:cs typeface="Times New Roman" charset="0"/>
-              </a:rPr>
-              <a:t> </a:t>
-            </a:r>
-            <a:r>
-              <a:rPr lang="en-US" altLang="zh-CN" sz="4400" dirty="0" smtClean="0">
-                <a:ea typeface="Times New Roman" charset="0"/>
-                <a:cs typeface="Times New Roman" charset="0"/>
-              </a:rPr>
-              <a:t>devices,</a:t>
-            </a:r>
-            <a:r>
-              <a:rPr lang="zh-CN" altLang="en-US" sz="4400" dirty="0" smtClean="0">
-                <a:ea typeface="Times New Roman" charset="0"/>
-                <a:cs typeface="Times New Roman" charset="0"/>
-              </a:rPr>
-              <a:t> </a:t>
-            </a:r>
-            <a:r>
-              <a:rPr lang="en-US" altLang="zh-CN" sz="4400" dirty="0" smtClean="0">
-                <a:ea typeface="Times New Roman" charset="0"/>
-                <a:cs typeface="Times New Roman" charset="0"/>
-              </a:rPr>
-              <a:t>or</a:t>
-            </a:r>
-            <a:r>
-              <a:rPr lang="zh-CN" altLang="en-US" sz="4400" dirty="0" smtClean="0">
-                <a:ea typeface="Times New Roman" charset="0"/>
-                <a:cs typeface="Times New Roman" charset="0"/>
-              </a:rPr>
-              <a:t> </a:t>
-            </a:r>
-            <a:r>
-              <a:rPr lang="en-US" altLang="zh-CN" sz="4400" dirty="0" smtClean="0">
-                <a:ea typeface="Times New Roman" charset="0"/>
-                <a:cs typeface="Times New Roman" charset="0"/>
-              </a:rPr>
-              <a:t>users</a:t>
-            </a:r>
-            <a:r>
-              <a:rPr lang="en-US" sz="4400" dirty="0" smtClean="0">
-                <a:ea typeface="Times New Roman" charset="0"/>
-                <a:cs typeface="Times New Roman" charset="0"/>
-              </a:rPr>
-              <a:t>.</a:t>
-            </a:r>
-          </a:p>
-          <a:p>
-            <a:pPr>
-              <a:spcAft>
-                <a:spcPts val="1800"/>
-              </a:spcAft>
-            </a:pPr>
-            <a:r>
-              <a:rPr lang="en-US" sz="4400" dirty="0" smtClean="0">
-                <a:ea typeface="Times New Roman" charset="0"/>
-                <a:cs typeface="Times New Roman" charset="0"/>
-              </a:rPr>
-              <a:t>• Modern devices only support DSCP-based </a:t>
-            </a:r>
-            <a:r>
-              <a:rPr lang="en-US" sz="4400" dirty="0" err="1" smtClean="0">
-                <a:ea typeface="Times New Roman" charset="0"/>
-                <a:cs typeface="Times New Roman" charset="0"/>
-              </a:rPr>
-              <a:t>QoS</a:t>
-            </a:r>
-            <a:r>
-              <a:rPr lang="en-US" sz="4400" dirty="0" smtClean="0">
-                <a:ea typeface="Times New Roman" charset="0"/>
-                <a:cs typeface="Times New Roman" charset="0"/>
-              </a:rPr>
-              <a:t> requiring applications to proactively set the right fields in IP header.</a:t>
-            </a:r>
-            <a:endParaRPr lang="zh-CN" altLang="en-US" sz="4400" dirty="0" smtClean="0">
+              <a:rPr lang="en-US" sz="4300" dirty="0" smtClean="0">
+                <a:ea typeface="Times New Roman" charset="0"/>
+                <a:cs typeface="Times New Roman" charset="0"/>
+              </a:rPr>
+              <a:t> requiring applications to set the corresponding fields in IP header.</a:t>
+            </a:r>
+            <a:endParaRPr lang="zh-CN" altLang="en-US" sz="4300" dirty="0" smtClean="0">
               <a:ea typeface="Times New Roman" charset="0"/>
               <a:cs typeface="Times New Roman" charset="0"/>
             </a:endParaRPr>
@@ -4405,8 +4235,8 @@
         </p:nvSpPr>
         <p:spPr>
           <a:xfrm>
-            <a:off x="797673" y="11822719"/>
-            <a:ext cx="11692890" cy="5293757"/>
+            <a:off x="662121" y="8523829"/>
+            <a:ext cx="13258093" cy="3477875"/>
           </a:xfrm>
           <a:prstGeom prst="rect">
             <a:avLst/>
@@ -4419,191 +4249,121 @@
           </a:bodyPr>
           <a:lstStyle/>
           <a:p>
-            <a:pPr>
+            <a:pPr marL="463550" indent="-463550" algn="just">
               <a:spcAft>
-                <a:spcPts val="1800"/>
+                <a:spcPts val="600"/>
               </a:spcAft>
+              <a:buFont typeface="Arial" panose="020B0604020202020204" pitchFamily="34" charset="0"/>
+              <a:buChar char="•"/>
             </a:pPr>
             <a:r>
-              <a:rPr lang="en-US" sz="4400" dirty="0" smtClean="0">
-                <a:ea typeface="Times New Roman" charset="0"/>
-                <a:cs typeface="Times New Roman" charset="0"/>
-              </a:rPr>
-              <a:t>•</a:t>
-            </a:r>
-            <a:r>
-              <a:rPr lang="zh-CN" altLang="en-US" sz="4400" dirty="0" smtClean="0">
+              <a:rPr lang="en-US" altLang="zh-CN" sz="4300" dirty="0" smtClean="0">
+                <a:ea typeface="Times New Roman" charset="0"/>
+                <a:cs typeface="Times New Roman" charset="0"/>
+              </a:rPr>
+              <a:t>I</a:t>
+            </a:r>
+            <a:r>
+              <a:rPr lang="en-US" sz="4300" dirty="0" smtClean="0">
+                <a:ea typeface="Times New Roman" charset="0"/>
+                <a:cs typeface="Times New Roman" charset="0"/>
+              </a:rPr>
+              <a:t>solate different traffic using </a:t>
+            </a:r>
+            <a:r>
+              <a:rPr lang="en-US" sz="4300" dirty="0" err="1" smtClean="0">
+                <a:ea typeface="Times New Roman" charset="0"/>
+                <a:cs typeface="Times New Roman" charset="0"/>
+              </a:rPr>
+              <a:t>OpenFlow</a:t>
+            </a:r>
+            <a:r>
+              <a:rPr lang="en-US" sz="4300" dirty="0" smtClean="0">
                 <a:ea typeface="Times New Roman" charset="0"/>
                 <a:cs typeface="Times New Roman" charset="0"/>
               </a:rPr>
               <a:t> </a:t>
             </a:r>
             <a:r>
-              <a:rPr lang="en-US" altLang="zh-CN" sz="4400" dirty="0" smtClean="0">
-                <a:ea typeface="Times New Roman" charset="0"/>
-                <a:cs typeface="Times New Roman" charset="0"/>
-              </a:rPr>
-              <a:t>I</a:t>
-            </a:r>
-            <a:r>
-              <a:rPr lang="en-US" sz="4400" dirty="0" smtClean="0">
-                <a:ea typeface="Times New Roman" charset="0"/>
-                <a:cs typeface="Times New Roman" charset="0"/>
-              </a:rPr>
-              <a:t>solate </a:t>
-            </a:r>
-            <a:r>
-              <a:rPr lang="en-US" sz="4400" dirty="0">
-                <a:ea typeface="Times New Roman" charset="0"/>
-                <a:cs typeface="Times New Roman" charset="0"/>
-              </a:rPr>
-              <a:t>different traffic in separate </a:t>
-            </a:r>
-            <a:r>
-              <a:rPr lang="en-US" sz="4400" dirty="0" smtClean="0">
-                <a:ea typeface="Times New Roman" charset="0"/>
-                <a:cs typeface="Times New Roman" charset="0"/>
-              </a:rPr>
-              <a:t>queues each having </a:t>
-            </a:r>
-            <a:r>
-              <a:rPr lang="en-US" sz="4400" dirty="0">
-                <a:ea typeface="Times New Roman" charset="0"/>
-                <a:cs typeface="Times New Roman" charset="0"/>
-              </a:rPr>
-              <a:t>a hard rate limit on </a:t>
-            </a:r>
-            <a:r>
-              <a:rPr lang="en-US" sz="4400" dirty="0" smtClean="0">
-                <a:ea typeface="Times New Roman" charset="0"/>
-                <a:cs typeface="Times New Roman" charset="0"/>
-              </a:rPr>
-              <a:t>that traffic.</a:t>
-            </a:r>
-          </a:p>
-          <a:p>
-            <a:pPr>
+              <a:rPr lang="en-US" sz="4300" dirty="0">
+                <a:ea typeface="Times New Roman" charset="0"/>
+                <a:cs typeface="Times New Roman" charset="0"/>
+              </a:rPr>
+              <a:t>in separate </a:t>
+            </a:r>
+            <a:r>
+              <a:rPr lang="en-US" sz="4300" dirty="0" smtClean="0">
+                <a:ea typeface="Times New Roman" charset="0"/>
+                <a:cs typeface="Times New Roman" charset="0"/>
+              </a:rPr>
+              <a:t>queues each rate limited using OVS ingress policing to it’s user-specified bandwidth share.</a:t>
+            </a:r>
+          </a:p>
+          <a:p>
+            <a:pPr marL="463550" indent="-463550" algn="just">
               <a:spcAft>
-                <a:spcPts val="1800"/>
+                <a:spcPts val="600"/>
               </a:spcAft>
+              <a:buFont typeface="Arial" panose="020B0604020202020204" pitchFamily="34" charset="0"/>
+              <a:buChar char="•"/>
             </a:pPr>
             <a:r>
-              <a:rPr lang="en-US" sz="4400" dirty="0">
-                <a:ea typeface="Times New Roman" charset="0"/>
-                <a:cs typeface="Times New Roman" charset="0"/>
-              </a:rPr>
-              <a:t>• </a:t>
-            </a:r>
-            <a:r>
-              <a:rPr lang="en-US" sz="4400" dirty="0" err="1" smtClean="0">
-                <a:ea typeface="Times New Roman" charset="0"/>
-                <a:cs typeface="Times New Roman" charset="0"/>
-              </a:rPr>
-              <a:t>Openflow</a:t>
-            </a:r>
-            <a:r>
-              <a:rPr lang="en-US" sz="4400" dirty="0" smtClean="0">
-                <a:ea typeface="Times New Roman" charset="0"/>
-                <a:cs typeface="Times New Roman" charset="0"/>
-              </a:rPr>
-              <a:t>-based isolation and OVS ingress policing for rate limiting traffic.</a:t>
-            </a:r>
-            <a:endParaRPr lang="zh-CN" altLang="en-US" sz="4400" dirty="0" smtClean="0">
-              <a:ea typeface="Times New Roman" charset="0"/>
-              <a:cs typeface="Times New Roman" charset="0"/>
-            </a:endParaRPr>
-          </a:p>
-          <a:p>
-            <a:pPr>
-              <a:spcAft>
-                <a:spcPts val="1800"/>
-              </a:spcAft>
-            </a:pPr>
-            <a:r>
-              <a:rPr lang="en-US" sz="4400" dirty="0" smtClean="0">
-                <a:ea typeface="Times New Roman" charset="0"/>
-                <a:cs typeface="Times New Roman" charset="0"/>
-              </a:rPr>
-              <a:t>•</a:t>
-            </a:r>
-            <a:r>
-              <a:rPr lang="en-US" sz="4400" dirty="0">
-                <a:ea typeface="Times New Roman" charset="0"/>
-                <a:cs typeface="Times New Roman" charset="0"/>
-              </a:rPr>
-              <a:t> </a:t>
-            </a:r>
-            <a:r>
-              <a:rPr lang="en-US" altLang="zh-CN" sz="4400" dirty="0" smtClean="0">
-                <a:ea typeface="Times New Roman" charset="0"/>
-                <a:cs typeface="Times New Roman" charset="0"/>
-              </a:rPr>
-              <a:t>U</a:t>
-            </a:r>
-            <a:r>
-              <a:rPr lang="en-US" sz="4400" dirty="0" smtClean="0">
-                <a:ea typeface="Times New Roman" charset="0"/>
-                <a:cs typeface="Times New Roman" charset="0"/>
-              </a:rPr>
-              <a:t>tili</a:t>
-            </a:r>
-            <a:r>
-              <a:rPr lang="en-US" altLang="zh-CN" sz="4400" dirty="0" smtClean="0">
+              <a:rPr lang="en-US" altLang="zh-CN" sz="4300" dirty="0" smtClean="0">
+                <a:ea typeface="Times New Roman" charset="0"/>
+                <a:cs typeface="Times New Roman" charset="0"/>
+              </a:rPr>
+              <a:t>Use </a:t>
+            </a:r>
+            <a:r>
+              <a:rPr lang="en-US" sz="4300" dirty="0" smtClean="0">
+                <a:ea typeface="Times New Roman" charset="0"/>
+                <a:cs typeface="Times New Roman" charset="0"/>
+              </a:rPr>
+              <a:t>Linux's </a:t>
+            </a:r>
+            <a:r>
+              <a:rPr lang="en-US" sz="4300" dirty="0">
+                <a:ea typeface="Times New Roman" charset="0"/>
+                <a:cs typeface="Times New Roman" charset="0"/>
+              </a:rPr>
+              <a:t>advanced routing and traffic control to </a:t>
+            </a:r>
+            <a:r>
+              <a:rPr lang="en-US" sz="4300" dirty="0" smtClean="0">
+                <a:ea typeface="Times New Roman" charset="0"/>
+                <a:cs typeface="Times New Roman" charset="0"/>
+              </a:rPr>
+              <a:t>prevent under-utili</a:t>
+            </a:r>
+            <a:r>
+              <a:rPr lang="en-US" altLang="zh-CN" sz="4300" dirty="0" smtClean="0">
                 <a:ea typeface="Times New Roman" charset="0"/>
                 <a:cs typeface="Times New Roman" charset="0"/>
               </a:rPr>
               <a:t>z</a:t>
             </a:r>
             <a:r>
-              <a:rPr lang="en-US" sz="4400" dirty="0" smtClean="0">
-                <a:ea typeface="Times New Roman" charset="0"/>
-                <a:cs typeface="Times New Roman" charset="0"/>
-              </a:rPr>
-              <a:t>e </a:t>
-            </a:r>
-            <a:r>
-              <a:rPr lang="en-US" sz="4400" dirty="0">
-                <a:ea typeface="Times New Roman" charset="0"/>
-                <a:cs typeface="Times New Roman" charset="0"/>
-              </a:rPr>
-              <a:t>the Linux's advanced routing and traffic control to overcome the limitation of </a:t>
-            </a:r>
-            <a:r>
-              <a:rPr lang="en-US" sz="4400" dirty="0" smtClean="0">
-                <a:ea typeface="Times New Roman" charset="0"/>
-                <a:cs typeface="Times New Roman" charset="0"/>
-              </a:rPr>
-              <a:t>under-utili</a:t>
-            </a:r>
-            <a:r>
-              <a:rPr lang="en-US" altLang="zh-CN" sz="4400" dirty="0" smtClean="0">
-                <a:ea typeface="Times New Roman" charset="0"/>
-                <a:cs typeface="Times New Roman" charset="0"/>
-              </a:rPr>
-              <a:t>z</a:t>
-            </a:r>
-            <a:r>
-              <a:rPr lang="en-US" sz="4400" dirty="0" smtClean="0">
+              <a:rPr lang="en-US" sz="4300" dirty="0" smtClean="0">
                 <a:ea typeface="Times New Roman" charset="0"/>
                 <a:cs typeface="Times New Roman" charset="0"/>
               </a:rPr>
               <a:t>ation </a:t>
             </a:r>
             <a:r>
-              <a:rPr lang="en-US" sz="4400" dirty="0">
-                <a:ea typeface="Times New Roman" charset="0"/>
-                <a:cs typeface="Times New Roman" charset="0"/>
-              </a:rPr>
-              <a:t>of available </a:t>
-            </a:r>
-            <a:r>
-              <a:rPr lang="en-US" sz="4400" dirty="0" smtClean="0">
-                <a:ea typeface="Times New Roman" charset="0"/>
-                <a:cs typeface="Times New Roman" charset="0"/>
-              </a:rPr>
-              <a:t>bandwidth.</a:t>
-            </a:r>
-            <a:endParaRPr lang="en-US" sz="4400" dirty="0">
+              <a:rPr lang="en-US" sz="4300" dirty="0">
+                <a:ea typeface="Times New Roman" charset="0"/>
+                <a:cs typeface="Times New Roman" charset="0"/>
+              </a:rPr>
+              <a:t>of </a:t>
+            </a:r>
+            <a:r>
+              <a:rPr lang="en-US" sz="4300" dirty="0" smtClean="0">
+                <a:ea typeface="Times New Roman" charset="0"/>
+                <a:cs typeface="Times New Roman" charset="0"/>
+              </a:rPr>
+              <a:t>available bandwidth.</a:t>
+            </a:r>
+            <a:endParaRPr lang="en-US" sz="4300" dirty="0">
               <a:ea typeface="Times New Roman" charset="0"/>
               <a:cs typeface="Times New Roman" charset="0"/>
             </a:endParaRPr>
@@ -4665,76 +4425,76 @@
           <a:p>
             <a:pPr algn="ctr"/>
             <a:r>
-              <a:rPr lang="en-US" altLang="zh-CN" sz="4400" dirty="0" smtClean="0">
+              <a:rPr lang="en-US" altLang="zh-CN" sz="4300" dirty="0" smtClean="0">
                 <a:ea typeface="Times New Roman" charset="0"/>
                 <a:cs typeface="Times New Roman" charset="0"/>
               </a:rPr>
               <a:t>Improvements</a:t>
             </a:r>
             <a:r>
-              <a:rPr lang="zh-CN" altLang="en-US" sz="4400" dirty="0" smtClean="0">
+              <a:rPr lang="zh-CN" altLang="en-US" sz="4300" dirty="0" smtClean="0">
                 <a:ea typeface="Times New Roman" charset="0"/>
                 <a:cs typeface="Times New Roman" charset="0"/>
               </a:rPr>
               <a:t> </a:t>
             </a:r>
             <a:r>
-              <a:rPr lang="en-US" altLang="zh-CN" sz="4400" dirty="0" smtClean="0">
+              <a:rPr lang="en-US" altLang="zh-CN" sz="4300" dirty="0" smtClean="0">
                 <a:ea typeface="Times New Roman" charset="0"/>
                 <a:cs typeface="Times New Roman" charset="0"/>
               </a:rPr>
               <a:t>to</a:t>
             </a:r>
             <a:r>
-              <a:rPr lang="zh-CN" altLang="en-US" sz="4400" dirty="0" smtClean="0">
+              <a:rPr lang="zh-CN" altLang="en-US" sz="4300" dirty="0" smtClean="0">
                 <a:ea typeface="Times New Roman" charset="0"/>
                 <a:cs typeface="Times New Roman" charset="0"/>
               </a:rPr>
               <a:t> </a:t>
             </a:r>
             <a:r>
-              <a:rPr lang="en-US" altLang="zh-CN" sz="4400" dirty="0">
+              <a:rPr lang="en-US" altLang="zh-CN" sz="4300" dirty="0">
                 <a:ea typeface="Times New Roman" charset="0"/>
                 <a:cs typeface="Times New Roman" charset="0"/>
               </a:rPr>
               <a:t>A</a:t>
             </a:r>
             <a:r>
-              <a:rPr lang="en-US" altLang="zh-CN" sz="4400" dirty="0" smtClean="0">
+              <a:rPr lang="en-US" altLang="zh-CN" sz="4300" dirty="0" smtClean="0">
                 <a:ea typeface="Times New Roman" charset="0"/>
                 <a:cs typeface="Times New Roman" charset="0"/>
               </a:rPr>
               <a:t>pplication</a:t>
             </a:r>
             <a:r>
-              <a:rPr lang="zh-CN" altLang="en-US" sz="4400" dirty="0" smtClean="0">
+              <a:rPr lang="zh-CN" altLang="en-US" sz="4300" dirty="0" smtClean="0">
                 <a:ea typeface="Times New Roman" charset="0"/>
                 <a:cs typeface="Times New Roman" charset="0"/>
               </a:rPr>
               <a:t> </a:t>
             </a:r>
             <a:r>
-              <a:rPr lang="en-US" altLang="zh-CN" sz="4400" dirty="0" smtClean="0">
+              <a:rPr lang="en-US" altLang="zh-CN" sz="4300" dirty="0" smtClean="0">
                 <a:ea typeface="Times New Roman" charset="0"/>
                 <a:cs typeface="Times New Roman" charset="0"/>
               </a:rPr>
               <a:t>Performance using OVS-</a:t>
             </a:r>
             <a:r>
-              <a:rPr lang="en-US" altLang="zh-CN" sz="4400" dirty="0" err="1" smtClean="0">
+              <a:rPr lang="en-US" altLang="zh-CN" sz="4300" dirty="0" err="1" smtClean="0">
                 <a:ea typeface="Times New Roman" charset="0"/>
                 <a:cs typeface="Times New Roman" charset="0"/>
               </a:rPr>
               <a:t>Openflow</a:t>
             </a:r>
             <a:r>
-              <a:rPr lang="en-US" altLang="zh-CN" sz="4400" dirty="0" smtClean="0">
+              <a:rPr lang="en-US" altLang="zh-CN" sz="4300" dirty="0" smtClean="0">
                 <a:ea typeface="Times New Roman" charset="0"/>
                 <a:cs typeface="Times New Roman" charset="0"/>
               </a:rPr>
               <a:t> Classification</a:t>
             </a:r>
-            <a:endParaRPr lang="en-US" sz="4400" dirty="0">
+            <a:endParaRPr lang="en-US" sz="4300" dirty="0">
               <a:ea typeface="Times New Roman" charset="0"/>
               <a:cs typeface="Times New Roman" charset="0"/>
             </a:endParaRPr>
@@ -4765,13 +4525,13 @@
           <a:p>
             <a:pPr algn="ctr"/>
             <a:r>
-              <a:rPr lang="en-US" altLang="zh-CN" sz="4400" dirty="0" smtClean="0">
+              <a:rPr lang="en-US" altLang="zh-CN" sz="4300" dirty="0" smtClean="0">
                 <a:ea typeface="Times New Roman" charset="0"/>
                 <a:cs typeface="Times New Roman" charset="0"/>
               </a:rPr>
               <a:t>Additional Gains from using Hierarchical Token Bucket (HTB) in Linux Traffic Control</a:t>
             </a:r>
-            <a:endParaRPr lang="en-US" sz="4400" dirty="0">
+            <a:endParaRPr lang="en-US" sz="4300" dirty="0">
               <a:ea typeface="Times New Roman" charset="0"/>
               <a:cs typeface="Times New Roman" charset="0"/>
             </a:endParaRPr>
@@ -4800,12 +4560,12 @@
           <a:graphicData uri="http://schemas.openxmlformats.org/presentationml/2006/ole">
             <mc:AlternateContent xmlns:mc="http://schemas.openxmlformats.org/markup-compatibility/2006">
               <mc:Choice xmlns:v="urn:schemas-microsoft-com:vml" Requires="v">
-                <p:oleObj spid="_x0000_s1453" name="Acrobat Document" r:id="rId5" imgW="2742882" imgH="1919957" progId="AcroExch.Document.DC">
+                <p:oleObj spid="_x0000_s2055" name="Acrobat Document" r:id="rId7" imgW="2742882" imgH="1919957" progId="AcroExch.Document.DC">
                   <p:embed/>
                 </p:oleObj>
               </mc:Choice>
               <mc:Fallback>
-                <p:oleObj name="Acrobat Document" r:id="rId5" imgW="2742882" imgH="1919957" progId="AcroExch.Document.DC">
+                <p:oleObj name="Acrobat Document" r:id="rId7" imgW="2742882" imgH="1919957" progId="AcroExch.Document.DC">
                   <p:embed/>
                   <p:pic>
                     <p:nvPicPr>
@@ -4814,7 +4574,7 @@
                       <p:nvPr/>
                     </p:nvPicPr>
                     <p:blipFill>
-                      <a:blip r:embed="rId6"/>
+                      <a:blip r:embed="rId8"/>
                       <a:stretch>
                         <a:fillRect/>
                       </a:stretch>
@@ -4862,12 +4622,12 @@
           <a:graphicData uri="http://schemas.openxmlformats.org/presentationml/2006/ole">
             <mc:AlternateContent xmlns:mc="http://schemas.openxmlformats.org/markup-compatibility/2006">
               <mc:Choice xmlns:v="urn:schemas-microsoft-com:vml" Requires="v">
-                <p:oleObj spid="_x0000_s1454" name="Acrobat Document" r:id="rId7" imgW="2742882" imgH="1919957" progId="AcroExch.Document.DC">
+                <p:oleObj spid="_x0000_s2056" name="Acrobat Document" r:id="rId9" imgW="2742882" imgH="1919957" progId="AcroExch.Document.DC">
                   <p:embed/>
                 </p:oleObj>
               </mc:Choice>
               <mc:Fallback>
-                <p:oleObj name="Acrobat Document" r:id="rId7" imgW="2742882" imgH="1919957" progId="AcroExch.Document.DC">
+                <p:oleObj name="Acrobat Document" r:id="rId9" imgW="2742882" imgH="1919957" progId="AcroExch.Document.DC">
                   <p:embed/>
                   <p:pic>
                     <p:nvPicPr>
@@ -4876,7 +4636,7 @@
                       <p:nvPr/>
                     </p:nvPicPr>
                     <p:blipFill>
-                      <a:blip r:embed="rId8"/>
+                      <a:blip r:embed="rId10"/>
                       <a:stretch>
                         <a:fillRect/>
                       </a:stretch>
@@ -4904,68 +4664,6 @@
       </p:graphicFrame>
       <p:graphicFrame>
         <p:nvGraphicFramePr>
-          <p:cNvPr id="9" name="Object 8"/>
-          <p:cNvGraphicFramePr>
-            <a:graphicFrameLocks noChangeAspect="1"/>
-          </p:cNvGraphicFramePr>
-          <p:nvPr>
-            <p:extLst>
-              <p:ext uri="{D42A27DB-BD31-4B8C-83A1-F6EECF244321}">
-                <p14:modId xmlns:p14="http://schemas.microsoft.com/office/powerpoint/2010/main" val="1770112403"/>
-              </p:ext>
-            </p:extLst>
-          </p:nvPr>
-        </p:nvGraphicFramePr>
-        <p:xfrm>
-          <a:off x="22735978" y="25995843"/>
-          <a:ext cx="9328982" cy="5371356"/>
-        </p:xfrm>
-        <a:graphic>
-          <a:graphicData uri="http://schemas.openxmlformats.org/presentationml/2006/ole">
-            <mc:AlternateContent xmlns:mc="http://schemas.openxmlformats.org/markup-compatibility/2006">
-              <mc:Choice xmlns:v="urn:schemas-microsoft-com:vml" Requires="v">
-                <p:oleObj spid="_x0000_s1455" name="Acrobat Document" r:id="rId9" imgW="2742882" imgH="1919957" progId="AcroExch.Document.DC">
-                  <p:embed/>
-                </p:oleObj>
-              </mc:Choice>
-              <mc:Fallback>
-                <p:oleObj name="Acrobat Document" r:id="rId9" imgW="2742882" imgH="1919957" progId="AcroExch.Document.DC">
-                  <p:embed/>
-                  <p:pic>
-                    <p:nvPicPr>
-                      <p:cNvPr id="0" name=""/>
-                      <p:cNvPicPr/>
-                      <p:nvPr/>
-                    </p:nvPicPr>
-                    <p:blipFill>
-                      <a:blip r:embed="rId10"/>
-                      <a:stretch>
-                        <a:fillRect/>
-                      </a:stretch>
-                    </p:blipFill>
-                    <p:spPr>
-                      <a:xfrm>
-                        <a:off x="22735978" y="25995843"/>
-                        <a:ext cx="9328982" cy="5371356"/>
-                      </a:xfrm>
-                      <a:prstGeom prst="rect">
-                        <a:avLst/>
-                      </a:prstGeom>
-                      <a:ln>
-                        <a:solidFill>
-                          <a:schemeClr val="tx1"/>
-                        </a:solidFill>
-                      </a:ln>
-                    </p:spPr>
-                  </p:pic>
-                </p:oleObj>
-              </mc:Fallback>
-            </mc:AlternateContent>
-          </a:graphicData>
-        </a:graphic>
-      </p:graphicFrame>
-      <p:graphicFrame>
-        <p:nvGraphicFramePr>
           <p:cNvPr id="10" name="Object 9"/>
           <p:cNvGraphicFramePr>
             <a:graphicFrameLocks noChangeAspect="1"/>
@@ -4986,7 +4684,7 @@
           <a:graphicData uri="http://schemas.openxmlformats.org/presentationml/2006/ole">
             <mc:AlternateContent xmlns:mc="http://schemas.openxmlformats.org/markup-compatibility/2006">
               <mc:Choice xmlns:v="urn:schemas-microsoft-com:vml" Requires="v">
-                <p:oleObj spid="_x0000_s1456" name="Acrobat Document" r:id="rId11" imgW="2742882" imgH="1919957" progId="AcroExch.Document.DC">
+                <p:oleObj spid="_x0000_s2057" name="Acrobat Document" r:id="rId11" imgW="2742882" imgH="1919957" progId="AcroExch.Document.DC">
                   <p:embed/>
                 </p:oleObj>
               </mc:Choice>
@@ -5048,7 +4746,7 @@
           <a:graphicData uri="http://schemas.openxmlformats.org/presentationml/2006/ole">
             <mc:AlternateContent xmlns:mc="http://schemas.openxmlformats.org/markup-compatibility/2006">
               <mc:Choice xmlns:v="urn:schemas-microsoft-com:vml" Requires="v">
-                <p:oleObj spid="_x0000_s1457" name="Acrobat Document" r:id="rId13" imgW="2742882" imgH="1919957" progId="AcroExch.Document.DC">
+                <p:oleObj spid="_x0000_s2058" name="Acrobat Document" r:id="rId13" imgW="2742882" imgH="1919957" progId="AcroExch.Document.DC">
                   <p:embed/>
                 </p:oleObj>
               </mc:Choice>
@@ -5110,7 +4808,7 @@
           <a:graphicData uri="http://schemas.openxmlformats.org/presentationml/2006/ole">
             <mc:AlternateContent xmlns:mc="http://schemas.openxmlformats.org/markup-compatibility/2006">
               <mc:Choice xmlns:v="urn:schemas-microsoft-com:vml" Requires="v">
-                <p:oleObj spid="_x0000_s1458" name="Acrobat Document" r:id="rId15" imgW="2742882" imgH="1919957" progId="AcroExch.Document.DC">
+                <p:oleObj spid="_x0000_s2059" name="Acrobat Document" r:id="rId15" imgW="2742882" imgH="1919957" progId="AcroExch.Document.DC">
                   <p:embed/>
                 </p:oleObj>
               </mc:Choice>
@@ -5150,76 +4848,6 @@
           </a:graphicData>
         </a:graphic>
       </p:graphicFrame>
-      <p:pic>
-        <p:nvPicPr>
-          <p:cNvPr id="40" name="Picture 39"/>
-          <p:cNvPicPr>
-            <a:picLocks noChangeAspect="1"/>
-          </p:cNvPicPr>
-          <p:nvPr/>
-        </p:nvPicPr>
-        <p:blipFill>
-          <a:blip r:embed="rId17">
-            <a:extLst>
-              <a:ext uri="{28A0092B-C50C-407E-A947-70E740481C1C}">
-                <a14:useLocalDpi xmlns:a14="http://schemas.microsoft.com/office/drawing/2010/main" val="0"/>
-              </a:ext>
-            </a:extLst>
-          </a:blip>
-          <a:stretch>
-            <a:fillRect/>
-          </a:stretch>
-        </p:blipFill>
-        <p:spPr>
-          <a:xfrm>
-            <a:off x="1337129" y="25995843"/>
-            <a:ext cx="8965111" cy="5371356"/>
-          </a:xfrm>
-          <a:prstGeom prst="rect">
-            <a:avLst/>
-          </a:prstGeom>
-          <a:ln>
-            <a:solidFill>
-              <a:schemeClr val="tx1"/>
-            </a:solidFill>
-          </a:ln>
-        </p:spPr>
-      </p:pic>
-      <p:pic>
-        <p:nvPicPr>
-          <p:cNvPr id="41" name="Picture 40"/>
-          <p:cNvPicPr>
-            <a:picLocks noChangeAspect="1"/>
-          </p:cNvPicPr>
-          <p:nvPr/>
-        </p:nvPicPr>
-        <p:blipFill>
-          <a:blip r:embed="rId18">
-            <a:extLst>
-              <a:ext uri="{28A0092B-C50C-407E-A947-70E740481C1C}">
-                <a14:useLocalDpi xmlns:a14="http://schemas.microsoft.com/office/drawing/2010/main" val="0"/>
-              </a:ext>
-            </a:extLst>
-          </a:blip>
-          <a:stretch>
-            <a:fillRect/>
-          </a:stretch>
-        </p:blipFill>
-        <p:spPr>
-          <a:xfrm>
-            <a:off x="11863230" y="25995843"/>
-            <a:ext cx="9100533" cy="5371356"/>
-          </a:xfrm>
-          <a:prstGeom prst="rect">
-            <a:avLst/>
-          </a:prstGeom>
-          <a:ln>
-            <a:solidFill>
-              <a:schemeClr val="tx1"/>
-            </a:solidFill>
-          </a:ln>
-        </p:spPr>
-      </p:pic>
       <p:sp>
         <p:nvSpPr>
           <p:cNvPr id="45" name="TextBox 44"/>
@@ -5244,13 +4872,13 @@
           <a:p>
             <a:pPr algn="ctr"/>
             <a:r>
-              <a:rPr lang="en-US" sz="4400" dirty="0" smtClean="0">
+              <a:rPr lang="en-US" sz="4300" dirty="0" smtClean="0">
                 <a:ea typeface="Times New Roman" charset="0"/>
                 <a:cs typeface="Times New Roman" charset="0"/>
               </a:rPr>
               <a:t>Reduced Skype Call Jitter</a:t>
             </a:r>
-            <a:endParaRPr lang="en-US" sz="4400" dirty="0">
+            <a:endParaRPr lang="en-US" sz="4300" dirty="0">
               <a:ea typeface="Times New Roman" charset="0"/>
               <a:cs typeface="Times New Roman" charset="0"/>
             </a:endParaRPr>
@@ -5281,27 +4909,13 @@
           <a:p>
             <a:pPr algn="ctr"/>
             <a:r>
-              <a:rPr lang="en-US" sz="4400" dirty="0" smtClean="0">
-                <a:ea typeface="Times New Roman" charset="0"/>
-                <a:cs typeface="Times New Roman" charset="0"/>
-              </a:rPr>
-              <a:t>Improved VLC </a:t>
-            </a:r>
-            <a:r>
-              <a:rPr lang="en-US" sz="4400" dirty="0" err="1" smtClean="0">
-                <a:ea typeface="Times New Roman" charset="0"/>
-                <a:cs typeface="Times New Roman" charset="0"/>
-              </a:rPr>
-              <a:t>Realtime</a:t>
-            </a:r>
-            <a:r>
-              <a:rPr lang="en-US" sz="4400" dirty="0" smtClean="0">
-                <a:ea typeface="Times New Roman" charset="0"/>
-                <a:cs typeface="Times New Roman" charset="0"/>
-              </a:rPr>
-              <a:t> Streaming Bitrate</a:t>
-            </a:r>
-            <a:endParaRPr lang="en-US" sz="4400" dirty="0">
+              <a:rPr lang="en-US" sz="4300" dirty="0" smtClean="0">
+                <a:ea typeface="Times New Roman" charset="0"/>
+                <a:cs typeface="Times New Roman" charset="0"/>
+              </a:rPr>
+              <a:t>Improved VLC Real-time Streaming Bitrate</a:t>
+            </a:r>
+            <a:endParaRPr lang="en-US" sz="4300" dirty="0">
               <a:ea typeface="Times New Roman" charset="0"/>
               <a:cs typeface="Times New Roman" charset="0"/>
             </a:endParaRPr>
@@ -5332,13 +4946,13 @@
           <a:p>
             <a:pPr algn="ctr"/>
             <a:r>
-              <a:rPr lang="en-US" sz="4400" dirty="0" smtClean="0">
+              <a:rPr lang="en-US" sz="4300" dirty="0" smtClean="0">
                 <a:ea typeface="Times New Roman" charset="0"/>
                 <a:cs typeface="Times New Roman" charset="0"/>
               </a:rPr>
               <a:t>Reduced Frame Drops and Segment Latency in DASH (HTTP) Video Streaming</a:t>
             </a:r>
-            <a:endParaRPr lang="en-US" sz="4400" dirty="0">
+            <a:endParaRPr lang="en-US" sz="4300" dirty="0">
               <a:ea typeface="Times New Roman" charset="0"/>
               <a:cs typeface="Times New Roman" charset="0"/>
             </a:endParaRPr>
@@ -5369,13 +4983,13 @@
           <a:p>
             <a:pPr algn="ctr"/>
             <a:r>
-              <a:rPr lang="en-US" sz="4400" dirty="0" smtClean="0">
+              <a:rPr lang="en-US" sz="4300" dirty="0" smtClean="0">
                 <a:ea typeface="Times New Roman" charset="0"/>
                 <a:cs typeface="Times New Roman" charset="0"/>
               </a:rPr>
               <a:t>Improved Worst-Case VLC Streaming Bitrate</a:t>
             </a:r>
-            <a:endParaRPr lang="en-US" sz="4400" dirty="0">
+            <a:endParaRPr lang="en-US" sz="4300" dirty="0">
               <a:ea typeface="Times New Roman" charset="0"/>
               <a:cs typeface="Times New Roman" charset="0"/>
             </a:endParaRPr>
@@ -5406,13 +5020,13 @@
           <a:p>
             <a:pPr algn="ctr"/>
             <a:r>
-              <a:rPr lang="en-US" sz="4400" dirty="0" smtClean="0">
+              <a:rPr lang="en-US" sz="4300" dirty="0" smtClean="0">
                 <a:ea typeface="Times New Roman" charset="0"/>
                 <a:cs typeface="Times New Roman" charset="0"/>
               </a:rPr>
               <a:t>Reduced Latencies in DASH Video Streaming</a:t>
             </a:r>
-            <a:endParaRPr lang="en-US" sz="4400" dirty="0">
+            <a:endParaRPr lang="en-US" sz="4300" dirty="0">
               <a:ea typeface="Times New Roman" charset="0"/>
               <a:cs typeface="Times New Roman" charset="0"/>
             </a:endParaRPr>
@@ -5560,10 +5174,10 @@
         </p:nvGrpSpPr>
         <p:grpSpPr>
           <a:xfrm>
-            <a:off x="12984203" y="3766400"/>
-            <a:ext cx="30241492" cy="13991696"/>
-            <a:chOff x="12853621" y="3771628"/>
-            <a:chExt cx="30180606" cy="13991696"/>
+            <a:off x="14611370" y="3767138"/>
+            <a:ext cx="28614324" cy="12656344"/>
+            <a:chOff x="14477513" y="3772366"/>
+            <a:chExt cx="28556714" cy="12656344"/>
           </a:xfrm>
         </p:grpSpPr>
         <p:sp>
@@ -5574,8 +5188,8 @@
           </p:nvSpPr>
           <p:spPr>
             <a:xfrm>
-              <a:off x="12853621" y="4041861"/>
-              <a:ext cx="15655369" cy="750471"/>
+              <a:off x="14477513" y="4041861"/>
+              <a:ext cx="15602418" cy="653113"/>
             </a:xfrm>
             <a:prstGeom prst="rect">
               <a:avLst/>
@@ -5587,8 +5201,8 @@
             </a:solidFill>
           </p:spPr>
           <p:txBody>
-            <a:bodyPr wrap="none" lIns="127000" tIns="127000" rIns="127000" bIns="127000" rtlCol="0">
-              <a:normAutofit fontScale="70000" lnSpcReduction="20000"/>
+            <a:bodyPr wrap="none" lIns="127000" tIns="127000" rIns="127000" bIns="127000" rtlCol="0" anchor="ctr">
+              <a:normAutofit fontScale="55000" lnSpcReduction="20000"/>
             </a:bodyPr>
             <a:lstStyle>
               <a:defPPr>
@@ -5614,7 +5228,7 @@
                 <a:t> </a:t>
               </a:r>
               <a:r>
-                <a:rPr lang="en-US" altLang="zh-CN" dirty="0" smtClean="0"/>
+                <a:rPr lang="en-US" altLang="zh-CN" dirty="0"/>
                 <a:t>Classification &amp; Rate Control</a:t>
               </a:r>
               <a:endParaRPr lang="en-US" dirty="0"/>
@@ -5629,8 +5243,8 @@
           </p:nvSpPr>
           <p:spPr>
             <a:xfrm>
-              <a:off x="13058756" y="11039066"/>
-              <a:ext cx="15450234" cy="828000"/>
+              <a:off x="14511390" y="11056809"/>
+              <a:ext cx="15602419" cy="656452"/>
             </a:xfrm>
             <a:prstGeom prst="rect">
               <a:avLst/>
@@ -5642,8 +5256,8 @@
             </a:solidFill>
           </p:spPr>
           <p:txBody>
-            <a:bodyPr wrap="none" lIns="127000" tIns="127000" rIns="127000" bIns="127000" rtlCol="0">
-              <a:normAutofit fontScale="77500" lnSpcReduction="20000"/>
+            <a:bodyPr wrap="none" lIns="127000" tIns="127000" rIns="127000" bIns="127000" rtlCol="0" anchor="ctr">
+              <a:normAutofit fontScale="55000" lnSpcReduction="20000"/>
             </a:bodyPr>
             <a:lstStyle>
               <a:defPPr>
@@ -5661,70 +5275,13 @@
             </a:lstStyle>
             <a:p>
               <a:r>
-                <a:rPr lang="en-US" altLang="zh-CN" dirty="0" smtClean="0"/>
+                <a:rPr lang="en-US" altLang="zh-CN" dirty="0"/>
                 <a:t>Linux Traffic Control</a:t>
               </a:r>
               <a:endParaRPr lang="en-US" dirty="0"/>
             </a:p>
           </p:txBody>
         </p:sp>
-        <p:graphicFrame>
-          <p:nvGraphicFramePr>
-            <p:cNvPr id="3" name="Object 2"/>
-            <p:cNvGraphicFramePr>
-              <a:graphicFrameLocks noChangeAspect="1"/>
-            </p:cNvGraphicFramePr>
-            <p:nvPr>
-              <p:extLst>
-                <p:ext uri="{D42A27DB-BD31-4B8C-83A1-F6EECF244321}">
-                  <p14:modId xmlns:p14="http://schemas.microsoft.com/office/powerpoint/2010/main" val="2651351725"/>
-                </p:ext>
-              </p:extLst>
-            </p:nvPr>
-          </p:nvGraphicFramePr>
-          <p:xfrm>
-            <a:off x="30575716" y="11024840"/>
-            <a:ext cx="11070818" cy="6738484"/>
-          </p:xfrm>
-          <a:graphic>
-            <a:graphicData uri="http://schemas.openxmlformats.org/presentationml/2006/ole">
-              <mc:AlternateContent xmlns:mc="http://schemas.openxmlformats.org/markup-compatibility/2006">
-                <mc:Choice xmlns:v="urn:schemas-microsoft-com:vml" Requires="v">
-                  <p:oleObj spid="_x0000_s1459" name="Acrobat Document" r:id="rId19" imgW="6034934" imgH="4663299" progId="AcroExch.Document.DC">
-                    <p:embed/>
-                  </p:oleObj>
-                </mc:Choice>
-                <mc:Fallback>
-                  <p:oleObj name="Acrobat Document" r:id="rId19" imgW="6034934" imgH="4663299" progId="AcroExch.Document.DC">
-                    <p:embed/>
-                    <p:pic>
-                      <p:nvPicPr>
-                        <p:cNvPr id="0" name=""/>
-                        <p:cNvPicPr/>
-                        <p:nvPr/>
-                      </p:nvPicPr>
-                      <p:blipFill>
-                        <a:blip r:embed="rId20"/>
-                        <a:stretch>
-                          <a:fillRect/>
-                        </a:stretch>
-                      </p:blipFill>
-                      <p:spPr>
-                        <a:xfrm>
-                          <a:off x="30575716" y="11024840"/>
-                          <a:ext cx="11070818" cy="6738484"/>
-                        </a:xfrm>
-                        <a:prstGeom prst="rect">
-                          <a:avLst/>
-                        </a:prstGeom>
-                      </p:spPr>
-                    </p:pic>
-                  </p:oleObj>
-                </mc:Fallback>
-              </mc:AlternateContent>
-            </a:graphicData>
-          </a:graphic>
-        </p:graphicFrame>
         <p:sp>
           <p:nvSpPr>
             <p:cNvPr id="69" name="TextBox 68"/>
@@ -5733,8 +5290,8 @@
           </p:nvSpPr>
           <p:spPr>
             <a:xfrm>
-              <a:off x="13058756" y="5054322"/>
-              <a:ext cx="15450234" cy="5816977"/>
+              <a:off x="14511389" y="4842880"/>
+              <a:ext cx="15602419" cy="5816977"/>
             </a:xfrm>
             <a:prstGeom prst="rect">
               <a:avLst/>
@@ -5747,25 +5304,13 @@
             </a:bodyPr>
             <a:lstStyle/>
             <a:p>
-              <a:pPr>
+              <a:pPr marL="463550" indent="-463550" algn="just">
                 <a:spcAft>
                   <a:spcPts val="600"/>
                 </a:spcAft>
+                <a:buFont typeface="Arial" panose="020B0604020202020204" pitchFamily="34" charset="0"/>
+                <a:buChar char="•"/>
               </a:pPr>
-              <a:r>
-                <a:rPr lang="en-US" sz="4400" dirty="0" smtClean="0">
-                  <a:ea typeface="Times New Roman" charset="0"/>
-                  <a:cs typeface="Times New Roman" charset="0"/>
-                </a:rPr>
-                <a:t>•</a:t>
-              </a:r>
-              <a:r>
-                <a:rPr lang="en-US" sz="4400" dirty="0">
-                  <a:ea typeface="Times New Roman" charset="0"/>
-                  <a:cs typeface="Times New Roman" charset="0"/>
-                </a:rPr>
-                <a:t> </a:t>
-              </a:r>
               <a:r>
                 <a:rPr lang="en-US" sz="4400" dirty="0" smtClean="0">
                   <a:ea typeface="Times New Roman" charset="0"/>
@@ -5912,17 +5457,19 @@
               </a:endParaRPr>
             </a:p>
             <a:p>
-              <a:pPr>
+              <a:pPr marL="463550" indent="-463550" algn="just">
                 <a:spcAft>
                   <a:spcPts val="600"/>
                 </a:spcAft>
+                <a:buFont typeface="Arial" panose="020B0604020202020204" pitchFamily="34" charset="0"/>
+                <a:buChar char="•"/>
               </a:pPr>
               <a:r>
                 <a:rPr lang="en-US" sz="4400" dirty="0" smtClean="0">
                   <a:ea typeface="Times New Roman" charset="0"/>
                   <a:cs typeface="Times New Roman" charset="0"/>
                 </a:rPr>
-                <a:t>• The</a:t>
+                <a:t>The</a:t>
               </a:r>
               <a:r>
                 <a:rPr lang="zh-CN" altLang="en-US" sz="4400" dirty="0" smtClean="0">
@@ -6160,28 +5707,23 @@
                   <a:ea typeface="Times New Roman" charset="0"/>
                   <a:cs typeface="Times New Roman" charset="0"/>
                 </a:rPr>
-                <a:t>traffic</a:t>
-              </a:r>
-              <a:r>
-                <a:rPr lang="en-US" sz="4400" dirty="0" smtClean="0">
-                  <a:ea typeface="Times New Roman" charset="0"/>
-                  <a:cs typeface="Times New Roman" charset="0"/>
-                </a:rPr>
-                <a:t>.</a:t>
+                <a:t>traffic.</a:t>
               </a:r>
             </a:p>
             <a:p>
-              <a:pPr>
+              <a:pPr marL="463550" indent="-463550" algn="just">
                 <a:spcAft>
                   <a:spcPts val="600"/>
                 </a:spcAft>
+                <a:buFont typeface="Arial" panose="020B0604020202020204" pitchFamily="34" charset="0"/>
+                <a:buChar char="•"/>
               </a:pPr>
               <a:r>
                 <a:rPr lang="en-US" sz="4400" dirty="0" smtClean="0">
                   <a:ea typeface="Times New Roman" charset="0"/>
                   <a:cs typeface="Times New Roman" charset="0"/>
                 </a:rPr>
-                <a:t>• Enables</a:t>
+                <a:t>Enables</a:t>
               </a:r>
               <a:r>
                 <a:rPr lang="zh-CN" altLang="en-US" sz="4400" dirty="0" smtClean="0">
@@ -6304,18 +5846,13 @@
               </a:r>
             </a:p>
             <a:p>
-              <a:pPr>
+              <a:pPr marL="463550" indent="-463550" algn="just">
                 <a:spcAft>
                   <a:spcPts val="600"/>
                 </a:spcAft>
+                <a:buFont typeface="Arial" panose="020B0604020202020204" pitchFamily="34" charset="0"/>
+                <a:buChar char="•"/>
               </a:pPr>
-              <a:r>
-                <a:rPr lang="en-US" sz="4400" dirty="0">
-                  <a:ea typeface="Times New Roman" charset="0"/>
-                  <a:cs typeface="Times New Roman" charset="0"/>
-                </a:rPr>
-                <a:t>• </a:t>
-              </a:r>
               <a:r>
                 <a:rPr lang="en-US" sz="4400" dirty="0" smtClean="0">
                   <a:ea typeface="Times New Roman" charset="0"/>
@@ -6479,18 +6016,13 @@
               </a:r>
             </a:p>
             <a:p>
-              <a:pPr>
+              <a:pPr marL="463550" indent="-463550" algn="just">
                 <a:spcAft>
                   <a:spcPts val="600"/>
                 </a:spcAft>
+                <a:buFont typeface="Arial" panose="020B0604020202020204" pitchFamily="34" charset="0"/>
+                <a:buChar char="•"/>
               </a:pPr>
-              <a:r>
-                <a:rPr lang="en-US" sz="4400" dirty="0">
-                  <a:ea typeface="Times New Roman" charset="0"/>
-                  <a:cs typeface="Times New Roman" charset="0"/>
-                </a:rPr>
-                <a:t>• </a:t>
-              </a:r>
               <a:r>
                 <a:rPr lang="en-US" sz="4400" dirty="0" smtClean="0">
                   <a:ea typeface="Times New Roman" charset="0"/>
@@ -6513,8 +6045,8 @@
           </p:nvSpPr>
           <p:spPr>
             <a:xfrm>
-              <a:off x="13045560" y="11965950"/>
-              <a:ext cx="15271490" cy="4462760"/>
+              <a:off x="14511390" y="11965950"/>
+              <a:ext cx="15493935" cy="4462760"/>
             </a:xfrm>
             <a:prstGeom prst="rect">
               <a:avLst/>
@@ -6527,19 +6059,14 @@
             </a:bodyPr>
             <a:lstStyle/>
             <a:p>
-              <a:pPr>
+              <a:pPr marL="457200" indent="-457200" algn="just">
                 <a:spcAft>
                   <a:spcPts val="1200"/>
                 </a:spcAft>
+                <a:buFont typeface="Arial" panose="020B0604020202020204" pitchFamily="34" charset="0"/>
+                <a:buChar char="•"/>
               </a:pPr>
               <a:r>
-                <a:rPr lang="en-US" sz="4400" dirty="0">
-                  <a:ea typeface="Times New Roman" charset="0"/>
-                  <a:cs typeface="Times New Roman" charset="0"/>
-                </a:rPr>
-                <a:t>• </a:t>
-              </a:r>
-              <a:r>
                 <a:rPr lang="en-US" sz="4400" dirty="0" smtClean="0">
                   <a:ea typeface="Times New Roman" charset="0"/>
                   <a:cs typeface="Times New Roman" charset="0"/>
@@ -6558,21 +6085,7 @@
                   <a:ea typeface="Times New Roman" charset="0"/>
                   <a:cs typeface="Times New Roman" charset="0"/>
                 </a:rPr>
-                <a:t> for Linux kernel’s network scheduler for low-level manipulation </a:t>
-              </a:r>
-              <a:r>
-                <a:rPr lang="en-US" sz="4400" dirty="0" smtClean="0">
-                  <a:ea typeface="Times New Roman" charset="0"/>
-                  <a:cs typeface="Times New Roman" charset="0"/>
-                </a:rPr>
-                <a:t>of</a:t>
-              </a:r>
-              <a:r>
-                <a:rPr lang="en-US" sz="4400" dirty="0" smtClean="0">
-                  <a:ea typeface="Times New Roman" charset="0"/>
-                  <a:cs typeface="Times New Roman" charset="0"/>
-                </a:rPr>
-                <a:t> network traffic flowing through it.</a:t>
+                <a:t> for Linux kernel’s network scheduler for low-level manipulation of network traffic flowing through it.</a:t>
               </a:r>
               <a:endParaRPr lang="zh-CN" altLang="en-US" sz="4400" b="1" dirty="0" smtClean="0">
                 <a:ea typeface="Times New Roman" charset="0"/>
@@ -6580,17 +6093,19 @@
               </a:endParaRPr>
             </a:p>
             <a:p>
-              <a:pPr>
+              <a:pPr marL="457200" indent="-457200" algn="just">
                 <a:spcAft>
                   <a:spcPts val="1200"/>
                 </a:spcAft>
+                <a:buFont typeface="Arial" panose="020B0604020202020204" pitchFamily="34" charset="0"/>
+                <a:buChar char="•"/>
               </a:pPr>
               <a:r>
                 <a:rPr lang="en-US" sz="4400" dirty="0" smtClean="0">
                   <a:ea typeface="Times New Roman" charset="0"/>
                   <a:cs typeface="Times New Roman" charset="0"/>
                 </a:rPr>
-                <a:t>• Implements multiple queuing disciplines, traffic policers and shapers to provide </a:t>
+                <a:t>Implements multiple queuing disciplines, traffic policers and shapers to provide </a:t>
               </a:r>
               <a:r>
                 <a:rPr lang="en-US" sz="4400" dirty="0" err="1" smtClean="0">
@@ -6611,33 +6126,24 @@
                   <a:ea typeface="Times New Roman" charset="0"/>
                   <a:cs typeface="Times New Roman" charset="0"/>
                 </a:rPr>
-                <a:t>to matching traffic</a:t>
-              </a:r>
-              <a:r>
-                <a:rPr lang="en-US" sz="4400" dirty="0" smtClean="0">
-                  <a:ea typeface="Times New Roman" charset="0"/>
-                  <a:cs typeface="Times New Roman" charset="0"/>
-                </a:rPr>
-                <a:t>.</a:t>
+                <a:t>to matching traffic.</a:t>
               </a:r>
             </a:p>
             <a:p>
-              <a:pPr>
+              <a:pPr marL="457200" indent="-457200" algn="just">
                 <a:spcAft>
                   <a:spcPts val="1200"/>
                 </a:spcAft>
+                <a:buFont typeface="Arial" panose="020B0604020202020204" pitchFamily="34" charset="0"/>
+                <a:buChar char="•"/>
               </a:pPr>
               <a:r>
                 <a:rPr lang="en-US" sz="4400" dirty="0" smtClean="0">
                   <a:ea typeface="Times New Roman" charset="0"/>
                   <a:cs typeface="Times New Roman" charset="0"/>
                 </a:rPr>
-                <a:t>• HTB is classful queueing discipline that supports multi-level traffic classification and shaping on egress traffic at an interface.</a:t>
-              </a:r>
-              <a:endParaRPr lang="en-US" sz="4400" dirty="0" smtClean="0">
-                <a:ea typeface="Times New Roman" charset="0"/>
-                <a:cs typeface="Times New Roman" charset="0"/>
-              </a:endParaRPr>
+                <a:t>HTB is classful queueing discipline that supports multi-level traffic classification and shaping on egress traffic at an interface.</a:t>
+              </a:r>
             </a:p>
           </p:txBody>
         </p:sp>
@@ -6650,25 +6156,25 @@
             <p:nvPr>
               <p:extLst>
                 <p:ext uri="{D42A27DB-BD31-4B8C-83A1-F6EECF244321}">
-                  <p14:modId xmlns:p14="http://schemas.microsoft.com/office/powerpoint/2010/main" val="3547218982"/>
+                  <p14:modId xmlns:p14="http://schemas.microsoft.com/office/powerpoint/2010/main" val="833126781"/>
                 </p:ext>
               </p:extLst>
             </p:nvPr>
           </p:nvGraphicFramePr>
           <p:xfrm>
-            <a:off x="29358466" y="3771628"/>
-            <a:ext cx="13591931" cy="8322384"/>
+            <a:off x="30575716" y="3772366"/>
+            <a:ext cx="12374885" cy="8321675"/>
           </p:xfrm>
           <a:graphic>
             <a:graphicData uri="http://schemas.openxmlformats.org/presentationml/2006/ole">
               <mc:AlternateContent xmlns:mc="http://schemas.openxmlformats.org/markup-compatibility/2006">
                 <mc:Choice xmlns:v="urn:schemas-microsoft-com:vml" Requires="v">
-                  <p:oleObj spid="_x0000_s1460" name="Acrobat Document" r:id="rId21" imgW="6034934" imgH="4663299" progId="AcroExch.Document.DC">
+                  <p:oleObj spid="_x0000_s2060" name="Acrobat Document" r:id="rId17" imgW="6034934" imgH="4663299" progId="AcroExch.Document.DC">
                     <p:embed/>
                   </p:oleObj>
                 </mc:Choice>
                 <mc:Fallback>
-                  <p:oleObj name="Acrobat Document" r:id="rId21" imgW="6034934" imgH="4663299" progId="AcroExch.Document.DC">
+                  <p:oleObj name="Acrobat Document" r:id="rId17" imgW="6034934" imgH="4663299" progId="AcroExch.Document.DC">
                     <p:embed/>
                     <p:pic>
                       <p:nvPicPr>
@@ -6677,15 +6183,15 @@
                         <p:nvPr/>
                       </p:nvPicPr>
                       <p:blipFill>
-                        <a:blip r:embed="rId22"/>
+                        <a:blip r:embed="rId18"/>
                         <a:stretch>
                           <a:fillRect/>
                         </a:stretch>
                       </p:blipFill>
                       <p:spPr>
                         <a:xfrm>
-                          <a:off x="29358466" y="3771628"/>
-                          <a:ext cx="13591931" cy="8322384"/>
+                          <a:off x="30575716" y="3772366"/>
+                          <a:ext cx="12374885" cy="8321675"/>
                         </a:xfrm>
                         <a:prstGeom prst="rect">
                           <a:avLst/>
@@ -6706,8 +6212,8 @@
           </p:nvSpPr>
           <p:spPr>
             <a:xfrm>
-              <a:off x="28947338" y="4034522"/>
-              <a:ext cx="14086889" cy="757810"/>
+              <a:off x="30435867" y="4034522"/>
+              <a:ext cx="12598359" cy="647587"/>
             </a:xfrm>
             <a:prstGeom prst="rect">
               <a:avLst/>
@@ -6719,8 +6225,8 @@
             </a:solidFill>
           </p:spPr>
           <p:txBody>
-            <a:bodyPr wrap="none" lIns="127000" tIns="127000" rIns="127000" bIns="127000" rtlCol="0">
-              <a:normAutofit fontScale="70000" lnSpcReduction="20000"/>
+            <a:bodyPr wrap="none" lIns="127000" tIns="127000" rIns="127000" bIns="127000" rtlCol="0" anchor="ctr">
+              <a:normAutofit fontScale="55000" lnSpcReduction="20000"/>
             </a:bodyPr>
             <a:lstStyle>
               <a:defPPr>
@@ -6738,11 +6244,11 @@
             </a:lstStyle>
             <a:p>
               <a:r>
-                <a:rPr lang="en-US" altLang="zh-CN" dirty="0" err="1" smtClean="0"/>
+                <a:rPr lang="en-US" altLang="zh-CN" dirty="0" err="1"/>
                 <a:t>FlowQoS</a:t>
               </a:r>
               <a:r>
-                <a:rPr lang="en-US" altLang="zh-CN" dirty="0" smtClean="0"/>
+                <a:rPr lang="en-US" altLang="zh-CN" dirty="0"/>
                 <a:t> Architecture</a:t>
               </a:r>
               <a:endParaRPr lang="en-US" dirty="0"/>
@@ -6757,8 +6263,8 @@
           </p:nvSpPr>
           <p:spPr>
             <a:xfrm>
-              <a:off x="28947338" y="11056808"/>
-              <a:ext cx="14086889" cy="819167"/>
+              <a:off x="30435867" y="11056808"/>
+              <a:ext cx="12598360" cy="628549"/>
             </a:xfrm>
             <a:prstGeom prst="rect">
               <a:avLst/>
@@ -6770,8 +6276,8 @@
             </a:solidFill>
           </p:spPr>
           <p:txBody>
-            <a:bodyPr wrap="none" lIns="127000" tIns="127000" rIns="127000" bIns="127000" rtlCol="0">
-              <a:normAutofit fontScale="77500" lnSpcReduction="20000"/>
+            <a:bodyPr wrap="none" lIns="127000" tIns="127000" rIns="127000" bIns="127000" rtlCol="0" anchor="ctr">
+              <a:noAutofit/>
             </a:bodyPr>
             <a:lstStyle>
               <a:defPPr>
@@ -6789,14 +6295,13 @@
             </a:lstStyle>
             <a:p>
               <a:r>
-                <a:rPr lang="en-US" dirty="0" err="1" smtClean="0"/>
+                <a:rPr lang="en-US" sz="3100" dirty="0" err="1"/>
                 <a:t>Heirarchical</a:t>
               </a:r>
               <a:r>
-                <a:rPr lang="en-US" dirty="0" smtClean="0"/>
+                <a:rPr lang="en-US" sz="3100" dirty="0"/>
                 <a:t> Token Bucket (HTB) Traffic Flow</a:t>
               </a:r>
-              <a:endParaRPr lang="en-US" dirty="0"/>
             </a:p>
           </p:txBody>
         </p:sp>
@@ -6849,8 +6354,8 @@
         </p:nvSpPr>
         <p:spPr>
           <a:xfrm>
-            <a:off x="12779069" y="3784248"/>
-            <a:ext cx="30651555" cy="13312125"/>
+            <a:off x="14356080" y="3784248"/>
+            <a:ext cx="29074544" cy="13312125"/>
           </a:xfrm>
           <a:prstGeom prst="rect">
             <a:avLst/>
@@ -6928,6 +6433,354 @@
           </a:p>
         </p:txBody>
       </p:sp>
+      <p:sp>
+        <p:nvSpPr>
+          <p:cNvPr id="73" name="TextBox 72"/>
+          <p:cNvSpPr txBox="1"/>
+          <p:nvPr/>
+        </p:nvSpPr>
+        <p:spPr>
+          <a:xfrm>
+            <a:off x="662122" y="12049492"/>
+            <a:ext cx="13258094" cy="666864"/>
+          </a:xfrm>
+          <a:prstGeom prst="rect">
+            <a:avLst/>
+          </a:prstGeom>
+          <a:solidFill>
+            <a:schemeClr val="accent1">
+              <a:lumMod val="75000"/>
+            </a:schemeClr>
+          </a:solidFill>
+        </p:spPr>
+        <p:txBody>
+          <a:bodyPr wrap="none" lIns="127000" tIns="127000" rIns="127000" bIns="127000" rtlCol="0" anchor="ctr">
+            <a:noAutofit/>
+          </a:bodyPr>
+          <a:lstStyle/>
+          <a:p>
+            <a:pPr algn="ctr"/>
+            <a:r>
+              <a:rPr lang="en-US" altLang="zh-CN" sz="3100" dirty="0" smtClean="0">
+                <a:solidFill>
+                  <a:schemeClr val="bg1"/>
+                </a:solidFill>
+                <a:latin typeface="Franklin Gothic Medium"/>
+                <a:cs typeface="Franklin Gothic Medium"/>
+              </a:rPr>
+              <a:t>Conclusion &amp; Future Work</a:t>
+            </a:r>
+            <a:endParaRPr lang="en-US" sz="3100" dirty="0">
+              <a:solidFill>
+                <a:schemeClr val="bg1"/>
+              </a:solidFill>
+              <a:latin typeface="Franklin Gothic Medium"/>
+              <a:cs typeface="Franklin Gothic Medium"/>
+            </a:endParaRPr>
+          </a:p>
+        </p:txBody>
+      </p:sp>
+      <p:sp>
+        <p:nvSpPr>
+          <p:cNvPr id="74" name="TextBox 73"/>
+          <p:cNvSpPr txBox="1"/>
+          <p:nvPr/>
+        </p:nvSpPr>
+        <p:spPr>
+          <a:xfrm>
+            <a:off x="662121" y="12773994"/>
+            <a:ext cx="13258094" cy="4293483"/>
+          </a:xfrm>
+          <a:prstGeom prst="rect">
+            <a:avLst/>
+          </a:prstGeom>
+          <a:noFill/>
+        </p:spPr>
+        <p:txBody>
+          <a:bodyPr wrap="square" rtlCol="0">
+            <a:spAutoFit/>
+          </a:bodyPr>
+          <a:lstStyle/>
+          <a:p>
+            <a:pPr marL="463550" indent="-463550" algn="just">
+              <a:spcAft>
+                <a:spcPts val="600"/>
+              </a:spcAft>
+              <a:buFont typeface="Arial" panose="020B0604020202020204" pitchFamily="34" charset="0"/>
+              <a:buChar char="•"/>
+            </a:pPr>
+            <a:r>
+              <a:rPr lang="en-US" sz="4300" dirty="0" err="1" smtClean="0">
+                <a:ea typeface="Times New Roman" charset="0"/>
+                <a:cs typeface="Times New Roman" charset="0"/>
+              </a:rPr>
+              <a:t>FlowQoS</a:t>
+            </a:r>
+            <a:r>
+              <a:rPr lang="en-US" sz="4300" dirty="0" smtClean="0">
+                <a:ea typeface="Times New Roman" charset="0"/>
+                <a:cs typeface="Times New Roman" charset="0"/>
+              </a:rPr>
+              <a:t> improves performance and user experience for time-sensitive applications.</a:t>
+            </a:r>
+            <a:endParaRPr lang="zh-CN" altLang="en-US" sz="4300" dirty="0" smtClean="0">
+              <a:ea typeface="Times New Roman" charset="0"/>
+              <a:cs typeface="Times New Roman" charset="0"/>
+            </a:endParaRPr>
+          </a:p>
+          <a:p>
+            <a:pPr marL="463550" indent="-463550" algn="just">
+              <a:spcAft>
+                <a:spcPts val="600"/>
+              </a:spcAft>
+              <a:buFont typeface="Arial" panose="020B0604020202020204" pitchFamily="34" charset="0"/>
+              <a:buChar char="•"/>
+            </a:pPr>
+            <a:r>
+              <a:rPr lang="en-US" altLang="zh-CN" sz="4300" dirty="0" smtClean="0">
+                <a:ea typeface="Times New Roman" charset="0"/>
+                <a:cs typeface="Times New Roman" charset="0"/>
+              </a:rPr>
+              <a:t>HTB-based solution smoothens traffic and improves bandwidth utilization but increases packet latencies.</a:t>
+            </a:r>
+          </a:p>
+          <a:p>
+            <a:pPr marL="463550" indent="-463550" algn="just">
+              <a:spcAft>
+                <a:spcPts val="600"/>
+              </a:spcAft>
+              <a:buFont typeface="Arial" panose="020B0604020202020204" pitchFamily="34" charset="0"/>
+              <a:buChar char="•"/>
+            </a:pPr>
+            <a:r>
+              <a:rPr lang="en-US" altLang="zh-CN" sz="4300" dirty="0" smtClean="0">
+                <a:ea typeface="Times New Roman" charset="0"/>
+                <a:cs typeface="Times New Roman" charset="0"/>
+              </a:rPr>
+              <a:t>Use OVS’s </a:t>
+            </a:r>
+            <a:r>
+              <a:rPr lang="en-US" altLang="zh-CN" sz="4300" dirty="0" err="1" smtClean="0">
+                <a:ea typeface="Times New Roman" charset="0"/>
+                <a:cs typeface="Times New Roman" charset="0"/>
+              </a:rPr>
+              <a:t>NetFlow</a:t>
+            </a:r>
+            <a:r>
+              <a:rPr lang="en-US" altLang="zh-CN" sz="4300" dirty="0" smtClean="0">
+                <a:ea typeface="Times New Roman" charset="0"/>
+                <a:cs typeface="Times New Roman" charset="0"/>
+              </a:rPr>
+              <a:t> support for metering and analytics.</a:t>
+            </a:r>
+          </a:p>
+          <a:p>
+            <a:pPr marL="463550" indent="-463550" algn="just">
+              <a:spcAft>
+                <a:spcPts val="600"/>
+              </a:spcAft>
+              <a:buFont typeface="Arial" panose="020B0604020202020204" pitchFamily="34" charset="0"/>
+              <a:buChar char="•"/>
+            </a:pPr>
+            <a:r>
+              <a:rPr lang="en-US" altLang="zh-CN" sz="4300" dirty="0" smtClean="0">
+                <a:ea typeface="Times New Roman" charset="0"/>
+                <a:cs typeface="Times New Roman" charset="0"/>
+              </a:rPr>
+              <a:t>Use SFQ discipline for equal share within each queue.</a:t>
+            </a:r>
+          </a:p>
+        </p:txBody>
+      </p:sp>
+      <p:graphicFrame>
+        <p:nvGraphicFramePr>
+          <p:cNvPr id="14" name="Object 13"/>
+          <p:cNvGraphicFramePr>
+            <a:graphicFrameLocks noChangeAspect="1"/>
+          </p:cNvGraphicFramePr>
+          <p:nvPr>
+            <p:extLst>
+              <p:ext uri="{D42A27DB-BD31-4B8C-83A1-F6EECF244321}">
+                <p14:modId xmlns:p14="http://schemas.microsoft.com/office/powerpoint/2010/main" val="3604721714"/>
+              </p:ext>
+            </p:extLst>
+          </p:nvPr>
+        </p:nvGraphicFramePr>
+        <p:xfrm>
+          <a:off x="1337129" y="25995842"/>
+          <a:ext cx="8965111" cy="5371357"/>
+        </p:xfrm>
+        <a:graphic>
+          <a:graphicData uri="http://schemas.openxmlformats.org/presentationml/2006/ole">
+            <mc:AlternateContent xmlns:mc="http://schemas.openxmlformats.org/markup-compatibility/2006">
+              <mc:Choice xmlns:v="urn:schemas-microsoft-com:vml" Requires="v">
+                <p:oleObj spid="_x0000_s2061" name="Acrobat Document" r:id="rId19" imgW="2742882" imgH="1919957" progId="AcroExch.Document.DC">
+                  <p:embed/>
+                </p:oleObj>
+              </mc:Choice>
+              <mc:Fallback>
+                <p:oleObj name="Acrobat Document" r:id="rId19" imgW="2742882" imgH="1919957" progId="AcroExch.Document.DC">
+                  <p:embed/>
+                  <p:pic>
+                    <p:nvPicPr>
+                      <p:cNvPr id="0" name=""/>
+                      <p:cNvPicPr/>
+                      <p:nvPr/>
+                    </p:nvPicPr>
+                    <p:blipFill>
+                      <a:blip r:embed="rId20"/>
+                      <a:stretch>
+                        <a:fillRect/>
+                      </a:stretch>
+                    </p:blipFill>
+                    <p:spPr>
+                      <a:xfrm>
+                        <a:off x="1337129" y="25995842"/>
+                        <a:ext cx="8965111" cy="5371357"/>
+                      </a:xfrm>
+                      <a:prstGeom prst="rect">
+                        <a:avLst/>
+                      </a:prstGeom>
+                      <a:ln w="9525">
+                        <a:solidFill>
+                          <a:schemeClr val="tx1"/>
+                        </a:solidFill>
+                      </a:ln>
+                    </p:spPr>
+                  </p:pic>
+                </p:oleObj>
+              </mc:Fallback>
+            </mc:AlternateContent>
+          </a:graphicData>
+        </a:graphic>
+      </p:graphicFrame>
+      <p:graphicFrame>
+        <p:nvGraphicFramePr>
+          <p:cNvPr id="18" name="Object 17"/>
+          <p:cNvGraphicFramePr>
+            <a:graphicFrameLocks noChangeAspect="1"/>
+          </p:cNvGraphicFramePr>
+          <p:nvPr>
+            <p:extLst>
+              <p:ext uri="{D42A27DB-BD31-4B8C-83A1-F6EECF244321}">
+                <p14:modId xmlns:p14="http://schemas.microsoft.com/office/powerpoint/2010/main" val="3924254765"/>
+              </p:ext>
+            </p:extLst>
+          </p:nvPr>
+        </p:nvGraphicFramePr>
+        <p:xfrm>
+          <a:off x="11863230" y="25963430"/>
+          <a:ext cx="9100534" cy="5403769"/>
+        </p:xfrm>
+        <a:graphic>
+          <a:graphicData uri="http://schemas.openxmlformats.org/presentationml/2006/ole">
+            <mc:AlternateContent xmlns:mc="http://schemas.openxmlformats.org/markup-compatibility/2006">
+              <mc:Choice xmlns:v="urn:schemas-microsoft-com:vml" Requires="v">
+                <p:oleObj spid="_x0000_s2062" name="Acrobat Document" r:id="rId21" imgW="2742882" imgH="1919957" progId="AcroExch.Document.DC">
+                  <p:embed/>
+                </p:oleObj>
+              </mc:Choice>
+              <mc:Fallback>
+                <p:oleObj name="Acrobat Document" r:id="rId21" imgW="2742882" imgH="1919957" progId="AcroExch.Document.DC">
+                  <p:embed/>
+                  <p:pic>
+                    <p:nvPicPr>
+                      <p:cNvPr id="0" name=""/>
+                      <p:cNvPicPr/>
+                      <p:nvPr/>
+                    </p:nvPicPr>
+                    <p:blipFill>
+                      <a:blip r:embed="rId22"/>
+                      <a:stretch>
+                        <a:fillRect/>
+                      </a:stretch>
+                    </p:blipFill>
+                    <p:spPr>
+                      <a:xfrm>
+                        <a:off x="11863230" y="25963430"/>
+                        <a:ext cx="9100534" cy="5403769"/>
+                      </a:xfrm>
+                      <a:prstGeom prst="rect">
+                        <a:avLst/>
+                      </a:prstGeom>
+                      <a:ln w="9525">
+                        <a:solidFill>
+                          <a:schemeClr val="tx1"/>
+                        </a:solidFill>
+                      </a:ln>
+                    </p:spPr>
+                  </p:pic>
+                </p:oleObj>
+              </mc:Fallback>
+            </mc:AlternateContent>
+          </a:graphicData>
+        </a:graphic>
+      </p:graphicFrame>
+      <p:graphicFrame>
+        <p:nvGraphicFramePr>
+          <p:cNvPr id="22" name="Object 21"/>
+          <p:cNvGraphicFramePr>
+            <a:graphicFrameLocks noChangeAspect="1"/>
+          </p:cNvGraphicFramePr>
+          <p:nvPr>
+            <p:extLst>
+              <p:ext uri="{D42A27DB-BD31-4B8C-83A1-F6EECF244321}">
+                <p14:modId xmlns:p14="http://schemas.microsoft.com/office/powerpoint/2010/main" val="1786587277"/>
+              </p:ext>
+            </p:extLst>
+          </p:nvPr>
+        </p:nvGraphicFramePr>
+        <p:xfrm>
+          <a:off x="22735977" y="25963430"/>
+          <a:ext cx="9328981" cy="5403769"/>
+        </p:xfrm>
+        <a:graphic>
+          <a:graphicData uri="http://schemas.openxmlformats.org/presentationml/2006/ole">
+            <mc:AlternateContent xmlns:mc="http://schemas.openxmlformats.org/markup-compatibility/2006">
+              <mc:Choice xmlns:v="urn:schemas-microsoft-com:vml" Requires="v">
+                <p:oleObj spid="_x0000_s2063" name="Acrobat Document" r:id="rId23" imgW="2742882" imgH="1919957" progId="AcroExch.Document.DC">
+                  <p:embed/>
+                </p:oleObj>
+              </mc:Choice>
+              <mc:Fallback>
+                <p:oleObj name="Acrobat Document" r:id="rId23" imgW="2742882" imgH="1919957" progId="AcroExch.Document.DC">
+                  <p:embed/>
+                  <p:pic>
+                    <p:nvPicPr>
+                      <p:cNvPr id="0" name=""/>
+                      <p:cNvPicPr/>
+                      <p:nvPr/>
+                    </p:nvPicPr>
+                    <p:blipFill>
+                      <a:blip r:embed="rId24"/>
+                      <a:stretch>
+                        <a:fillRect/>
+                      </a:stretch>
+                    </p:blipFill>
+                    <p:spPr>
+                      <a:xfrm>
+                        <a:off x="22735977" y="25963430"/>
+                        <a:ext cx="9328981" cy="5403769"/>
+                      </a:xfrm>
+                      <a:prstGeom prst="rect">
+                        <a:avLst/>
+                      </a:prstGeom>
+                      <a:solidFill>
+                        <a:schemeClr val="tx1"/>
+                      </a:solidFill>
+                      <a:ln w="9525">
+                        <a:solidFill>
+                          <a:schemeClr val="tx1"/>
+                        </a:solidFill>
+                      </a:ln>
+                    </p:spPr>
+                  </p:pic>
+                </p:oleObj>
+              </mc:Fallback>
+            </mc:AlternateContent>
+          </a:graphicData>
+        </a:graphic>
+      </p:graphicFrame>
     </p:spTree>
   </p:cSld>
   <p:clrMapOvr>

</xml_diff>

<commit_message>
Updated corrected latency comparison graph.
</commit_message>
<xml_diff>
--- a/FlowQoS_poster.pptx
+++ b/FlowQoS_poster.pptx
@@ -3546,7 +3546,7 @@
           <a:graphicData uri="http://schemas.openxmlformats.org/presentationml/2006/ole">
             <mc:AlternateContent xmlns:mc="http://schemas.openxmlformats.org/markup-compatibility/2006">
               <mc:Choice xmlns:v="urn:schemas-microsoft-com:vml" Requires="v">
-                <p:oleObj spid="_x0000_s2054" name="Acrobat Document" r:id="rId4" imgW="6034934" imgH="4663299" progId="AcroExch.Document.DC">
+                <p:oleObj spid="_x0000_s2124" name="Acrobat Document" r:id="rId4" imgW="6034934" imgH="4663299" progId="AcroExch.Document.DC">
                   <p:embed/>
                 </p:oleObj>
               </mc:Choice>
@@ -4540,27 +4540,27 @@
       </p:sp>
       <p:graphicFrame>
         <p:nvGraphicFramePr>
-          <p:cNvPr id="7" name="Object 6"/>
+          <p:cNvPr id="10" name="Object 9"/>
           <p:cNvGraphicFramePr>
             <a:graphicFrameLocks noChangeAspect="1"/>
           </p:cNvGraphicFramePr>
           <p:nvPr>
             <p:extLst>
               <p:ext uri="{D42A27DB-BD31-4B8C-83A1-F6EECF244321}">
-                <p14:modId xmlns:p14="http://schemas.microsoft.com/office/powerpoint/2010/main" val="397508593"/>
+                <p14:modId xmlns:p14="http://schemas.microsoft.com/office/powerpoint/2010/main" val="2568193536"/>
               </p:ext>
             </p:extLst>
           </p:nvPr>
         </p:nvGraphicFramePr>
         <p:xfrm>
-          <a:off x="33500947" y="26547739"/>
-          <a:ext cx="9171162" cy="5063128"/>
+          <a:off x="1337129" y="19333619"/>
+          <a:ext cx="8965111" cy="5429077"/>
         </p:xfrm>
         <a:graphic>
           <a:graphicData uri="http://schemas.openxmlformats.org/presentationml/2006/ole">
             <mc:AlternateContent xmlns:mc="http://schemas.openxmlformats.org/markup-compatibility/2006">
               <mc:Choice xmlns:v="urn:schemas-microsoft-com:vml" Requires="v">
-                <p:oleObj spid="_x0000_s2055" name="Acrobat Document" r:id="rId7" imgW="2742882" imgH="1919957" progId="AcroExch.Document.DC">
+                <p:oleObj spid="_x0000_s2125" name="Acrobat Document" r:id="rId7" imgW="2742882" imgH="1919957" progId="AcroExch.Document.DC">
                   <p:embed/>
                 </p:oleObj>
               </mc:Choice>
@@ -4575,130 +4575,6 @@
                     </p:nvPicPr>
                     <p:blipFill>
                       <a:blip r:embed="rId8"/>
-                      <a:stretch>
-                        <a:fillRect/>
-                      </a:stretch>
-                    </p:blipFill>
-                    <p:spPr>
-                      <a:xfrm>
-                        <a:off x="33500947" y="26547739"/>
-                        <a:ext cx="9171162" cy="5063128"/>
-                      </a:xfrm>
-                      <a:prstGeom prst="rect">
-                        <a:avLst/>
-                      </a:prstGeom>
-                      <a:ln>
-                        <a:solidFill>
-                          <a:schemeClr val="tx1"/>
-                        </a:solidFill>
-                      </a:ln>
-                    </p:spPr>
-                  </p:pic>
-                </p:oleObj>
-              </mc:Fallback>
-            </mc:AlternateContent>
-          </a:graphicData>
-        </a:graphic>
-      </p:graphicFrame>
-      <p:graphicFrame>
-        <p:nvGraphicFramePr>
-          <p:cNvPr id="8" name="Object 7"/>
-          <p:cNvGraphicFramePr>
-            <a:graphicFrameLocks noChangeAspect="1"/>
-          </p:cNvGraphicFramePr>
-          <p:nvPr>
-            <p:extLst>
-              <p:ext uri="{D42A27DB-BD31-4B8C-83A1-F6EECF244321}">
-                <p14:modId xmlns:p14="http://schemas.microsoft.com/office/powerpoint/2010/main" val="2987532227"/>
-              </p:ext>
-            </p:extLst>
-          </p:nvPr>
-        </p:nvGraphicFramePr>
-        <p:xfrm>
-          <a:off x="33500947" y="19260109"/>
-          <a:ext cx="9126268" cy="5172220"/>
-        </p:xfrm>
-        <a:graphic>
-          <a:graphicData uri="http://schemas.openxmlformats.org/presentationml/2006/ole">
-            <mc:AlternateContent xmlns:mc="http://schemas.openxmlformats.org/markup-compatibility/2006">
-              <mc:Choice xmlns:v="urn:schemas-microsoft-com:vml" Requires="v">
-                <p:oleObj spid="_x0000_s2056" name="Acrobat Document" r:id="rId9" imgW="2742882" imgH="1919957" progId="AcroExch.Document.DC">
-                  <p:embed/>
-                </p:oleObj>
-              </mc:Choice>
-              <mc:Fallback>
-                <p:oleObj name="Acrobat Document" r:id="rId9" imgW="2742882" imgH="1919957" progId="AcroExch.Document.DC">
-                  <p:embed/>
-                  <p:pic>
-                    <p:nvPicPr>
-                      <p:cNvPr id="0" name=""/>
-                      <p:cNvPicPr/>
-                      <p:nvPr/>
-                    </p:nvPicPr>
-                    <p:blipFill>
-                      <a:blip r:embed="rId10"/>
-                      <a:stretch>
-                        <a:fillRect/>
-                      </a:stretch>
-                    </p:blipFill>
-                    <p:spPr>
-                      <a:xfrm>
-                        <a:off x="33500947" y="19260109"/>
-                        <a:ext cx="9126268" cy="5172220"/>
-                      </a:xfrm>
-                      <a:prstGeom prst="rect">
-                        <a:avLst/>
-                      </a:prstGeom>
-                      <a:ln>
-                        <a:solidFill>
-                          <a:schemeClr val="tx1"/>
-                        </a:solidFill>
-                      </a:ln>
-                    </p:spPr>
-                  </p:pic>
-                </p:oleObj>
-              </mc:Fallback>
-            </mc:AlternateContent>
-          </a:graphicData>
-        </a:graphic>
-      </p:graphicFrame>
-      <p:graphicFrame>
-        <p:nvGraphicFramePr>
-          <p:cNvPr id="10" name="Object 9"/>
-          <p:cNvGraphicFramePr>
-            <a:graphicFrameLocks noChangeAspect="1"/>
-          </p:cNvGraphicFramePr>
-          <p:nvPr>
-            <p:extLst>
-              <p:ext uri="{D42A27DB-BD31-4B8C-83A1-F6EECF244321}">
-                <p14:modId xmlns:p14="http://schemas.microsoft.com/office/powerpoint/2010/main" val="2568193536"/>
-              </p:ext>
-            </p:extLst>
-          </p:nvPr>
-        </p:nvGraphicFramePr>
-        <p:xfrm>
-          <a:off x="1337129" y="19333619"/>
-          <a:ext cx="8965111" cy="5429077"/>
-        </p:xfrm>
-        <a:graphic>
-          <a:graphicData uri="http://schemas.openxmlformats.org/presentationml/2006/ole">
-            <mc:AlternateContent xmlns:mc="http://schemas.openxmlformats.org/markup-compatibility/2006">
-              <mc:Choice xmlns:v="urn:schemas-microsoft-com:vml" Requires="v">
-                <p:oleObj spid="_x0000_s2057" name="Acrobat Document" r:id="rId11" imgW="2742882" imgH="1919957" progId="AcroExch.Document.DC">
-                  <p:embed/>
-                </p:oleObj>
-              </mc:Choice>
-              <mc:Fallback>
-                <p:oleObj name="Acrobat Document" r:id="rId11" imgW="2742882" imgH="1919957" progId="AcroExch.Document.DC">
-                  <p:embed/>
-                  <p:pic>
-                    <p:nvPicPr>
-                      <p:cNvPr id="0" name=""/>
-                      <p:cNvPicPr/>
-                      <p:nvPr/>
-                    </p:nvPicPr>
-                    <p:blipFill>
-                      <a:blip r:embed="rId12"/>
                       <a:stretch>
                         <a:fillRect/>
                       </a:stretch>
@@ -4746,12 +4622,12 @@
           <a:graphicData uri="http://schemas.openxmlformats.org/presentationml/2006/ole">
             <mc:AlternateContent xmlns:mc="http://schemas.openxmlformats.org/markup-compatibility/2006">
               <mc:Choice xmlns:v="urn:schemas-microsoft-com:vml" Requires="v">
-                <p:oleObj spid="_x0000_s2058" name="Acrobat Document" r:id="rId13" imgW="2742882" imgH="1919957" progId="AcroExch.Document.DC">
+                <p:oleObj spid="_x0000_s2126" name="Acrobat Document" r:id="rId9" imgW="2742882" imgH="1919957" progId="AcroExch.Document.DC">
                   <p:embed/>
                 </p:oleObj>
               </mc:Choice>
               <mc:Fallback>
-                <p:oleObj name="Acrobat Document" r:id="rId13" imgW="2742882" imgH="1919957" progId="AcroExch.Document.DC">
+                <p:oleObj name="Acrobat Document" r:id="rId9" imgW="2742882" imgH="1919957" progId="AcroExch.Document.DC">
                   <p:embed/>
                   <p:pic>
                     <p:nvPicPr>
@@ -4760,7 +4636,7 @@
                       <p:nvPr/>
                     </p:nvPicPr>
                     <p:blipFill>
-                      <a:blip r:embed="rId14"/>
+                      <a:blip r:embed="rId10"/>
                       <a:stretch>
                         <a:fillRect/>
                       </a:stretch>
@@ -4808,12 +4684,12 @@
           <a:graphicData uri="http://schemas.openxmlformats.org/presentationml/2006/ole">
             <mc:AlternateContent xmlns:mc="http://schemas.openxmlformats.org/markup-compatibility/2006">
               <mc:Choice xmlns:v="urn:schemas-microsoft-com:vml" Requires="v">
-                <p:oleObj spid="_x0000_s2059" name="Acrobat Document" r:id="rId15" imgW="2742882" imgH="1919957" progId="AcroExch.Document.DC">
+                <p:oleObj spid="_x0000_s2127" name="Acrobat Document" r:id="rId11" imgW="2742882" imgH="1919957" progId="AcroExch.Document.DC">
                   <p:embed/>
                 </p:oleObj>
               </mc:Choice>
               <mc:Fallback>
-                <p:oleObj name="Acrobat Document" r:id="rId15" imgW="2742882" imgH="1919957" progId="AcroExch.Document.DC">
+                <p:oleObj name="Acrobat Document" r:id="rId11" imgW="2742882" imgH="1919957" progId="AcroExch.Document.DC">
                   <p:embed/>
                   <p:pic>
                     <p:nvPicPr>
@@ -4822,7 +4698,7 @@
                       <p:nvPr/>
                     </p:nvPicPr>
                     <p:blipFill>
-                      <a:blip r:embed="rId16"/>
+                      <a:blip r:embed="rId12"/>
                       <a:stretch>
                         <a:fillRect/>
                       </a:stretch>
@@ -6169,12 +6045,12 @@
             <a:graphicData uri="http://schemas.openxmlformats.org/presentationml/2006/ole">
               <mc:AlternateContent xmlns:mc="http://schemas.openxmlformats.org/markup-compatibility/2006">
                 <mc:Choice xmlns:v="urn:schemas-microsoft-com:vml" Requires="v">
-                  <p:oleObj spid="_x0000_s2060" name="Acrobat Document" r:id="rId17" imgW="6034934" imgH="4663299" progId="AcroExch.Document.DC">
+                  <p:oleObj spid="_x0000_s2128" name="Acrobat Document" r:id="rId13" imgW="6034934" imgH="4663299" progId="AcroExch.Document.DC">
                     <p:embed/>
                   </p:oleObj>
                 </mc:Choice>
                 <mc:Fallback>
-                  <p:oleObj name="Acrobat Document" r:id="rId17" imgW="6034934" imgH="4663299" progId="AcroExch.Document.DC">
+                  <p:oleObj name="Acrobat Document" r:id="rId13" imgW="6034934" imgH="4663299" progId="AcroExch.Document.DC">
                     <p:embed/>
                     <p:pic>
                       <p:nvPicPr>
@@ -6183,7 +6059,7 @@
                         <p:nvPr/>
                       </p:nvPicPr>
                       <p:blipFill>
-                        <a:blip r:embed="rId18"/>
+                        <a:blip r:embed="rId14"/>
                         <a:stretch>
                           <a:fillRect/>
                         </a:stretch>
@@ -6541,7 +6417,42 @@
                 <a:ea typeface="Times New Roman" charset="0"/>
                 <a:cs typeface="Times New Roman" charset="0"/>
               </a:rPr>
-              <a:t>HTB-based solution smoothens traffic and improves bandwidth utilization but increases packet latencies.</a:t>
+              <a:t>HTB-based solution smoothens traffic and improves bandwidth </a:t>
+            </a:r>
+            <a:r>
+              <a:rPr lang="en-US" altLang="zh-CN" sz="4300" dirty="0" smtClean="0">
+                <a:ea typeface="Times New Roman" charset="0"/>
+                <a:cs typeface="Times New Roman" charset="0"/>
+              </a:rPr>
+              <a:t>usage </a:t>
+            </a:r>
+            <a:r>
+              <a:rPr lang="en-US" altLang="zh-CN" sz="4300" smtClean="0">
+                <a:ea typeface="Times New Roman" charset="0"/>
+                <a:cs typeface="Times New Roman" charset="0"/>
+              </a:rPr>
+              <a:t>but </a:t>
+            </a:r>
+            <a:r>
+              <a:rPr lang="en-US" altLang="zh-CN" sz="4300" smtClean="0">
+                <a:ea typeface="Times New Roman" charset="0"/>
+                <a:cs typeface="Times New Roman" charset="0"/>
+              </a:rPr>
+              <a:t>might increases </a:t>
+            </a:r>
+            <a:r>
+              <a:rPr lang="en-US" altLang="zh-CN" sz="4300" dirty="0" smtClean="0">
+                <a:ea typeface="Times New Roman" charset="0"/>
+                <a:cs typeface="Times New Roman" charset="0"/>
+              </a:rPr>
+              <a:t>latencies</a:t>
+            </a:r>
+            <a:r>
+              <a:rPr lang="en-US" altLang="zh-CN" sz="4300" dirty="0" smtClean="0">
+                <a:ea typeface="Times New Roman" charset="0"/>
+                <a:cs typeface="Times New Roman" charset="0"/>
+              </a:rPr>
+              <a:t>.</a:t>
             </a:r>
           </a:p>
           <a:p>
@@ -6614,12 +6525,12 @@
           <a:graphicData uri="http://schemas.openxmlformats.org/presentationml/2006/ole">
             <mc:AlternateContent xmlns:mc="http://schemas.openxmlformats.org/markup-compatibility/2006">
               <mc:Choice xmlns:v="urn:schemas-microsoft-com:vml" Requires="v">
-                <p:oleObj spid="_x0000_s2061" name="Acrobat Document" r:id="rId19" imgW="2742882" imgH="1919957" progId="AcroExch.Document.DC">
+                <p:oleObj spid="_x0000_s2129" name="Acrobat Document" r:id="rId15" imgW="2742882" imgH="1919957" progId="AcroExch.Document.DC">
                   <p:embed/>
                 </p:oleObj>
               </mc:Choice>
               <mc:Fallback>
-                <p:oleObj name="Acrobat Document" r:id="rId19" imgW="2742882" imgH="1919957" progId="AcroExch.Document.DC">
+                <p:oleObj name="Acrobat Document" r:id="rId15" imgW="2742882" imgH="1919957" progId="AcroExch.Document.DC">
                   <p:embed/>
                   <p:pic>
                     <p:nvPicPr>
@@ -6628,7 +6539,7 @@
                       <p:nvPr/>
                     </p:nvPicPr>
                     <p:blipFill>
-                      <a:blip r:embed="rId20"/>
+                      <a:blip r:embed="rId16"/>
                       <a:stretch>
                         <a:fillRect/>
                       </a:stretch>
@@ -6676,12 +6587,12 @@
           <a:graphicData uri="http://schemas.openxmlformats.org/presentationml/2006/ole">
             <mc:AlternateContent xmlns:mc="http://schemas.openxmlformats.org/markup-compatibility/2006">
               <mc:Choice xmlns:v="urn:schemas-microsoft-com:vml" Requires="v">
-                <p:oleObj spid="_x0000_s2062" name="Acrobat Document" r:id="rId21" imgW="2742882" imgH="1919957" progId="AcroExch.Document.DC">
+                <p:oleObj spid="_x0000_s2130" name="Acrobat Document" r:id="rId17" imgW="2742882" imgH="1919957" progId="AcroExch.Document.DC">
                   <p:embed/>
                 </p:oleObj>
               </mc:Choice>
               <mc:Fallback>
-                <p:oleObj name="Acrobat Document" r:id="rId21" imgW="2742882" imgH="1919957" progId="AcroExch.Document.DC">
+                <p:oleObj name="Acrobat Document" r:id="rId17" imgW="2742882" imgH="1919957" progId="AcroExch.Document.DC">
                   <p:embed/>
                   <p:pic>
                     <p:nvPicPr>
@@ -6690,7 +6601,7 @@
                       <p:nvPr/>
                     </p:nvPicPr>
                     <p:blipFill>
-                      <a:blip r:embed="rId22"/>
+                      <a:blip r:embed="rId18"/>
                       <a:stretch>
                         <a:fillRect/>
                       </a:stretch>
@@ -6718,27 +6629,153 @@
       </p:graphicFrame>
       <p:graphicFrame>
         <p:nvGraphicFramePr>
-          <p:cNvPr id="22" name="Object 21"/>
+          <p:cNvPr id="3" name="Object 2"/>
           <p:cNvGraphicFramePr>
             <a:graphicFrameLocks noChangeAspect="1"/>
           </p:cNvGraphicFramePr>
           <p:nvPr>
             <p:extLst>
               <p:ext uri="{D42A27DB-BD31-4B8C-83A1-F6EECF244321}">
-                <p14:modId xmlns:p14="http://schemas.microsoft.com/office/powerpoint/2010/main" val="1786587277"/>
+                <p14:modId xmlns:p14="http://schemas.microsoft.com/office/powerpoint/2010/main" val="3515471107"/>
               </p:ext>
             </p:extLst>
           </p:nvPr>
         </p:nvGraphicFramePr>
         <p:xfrm>
-          <a:off x="22735977" y="25963430"/>
-          <a:ext cx="9328981" cy="5403769"/>
+          <a:off x="33500947" y="19408376"/>
+          <a:ext cx="9171162" cy="5040665"/>
         </p:xfrm>
         <a:graphic>
           <a:graphicData uri="http://schemas.openxmlformats.org/presentationml/2006/ole">
             <mc:AlternateContent xmlns:mc="http://schemas.openxmlformats.org/markup-compatibility/2006">
               <mc:Choice xmlns:v="urn:schemas-microsoft-com:vml" Requires="v">
-                <p:oleObj spid="_x0000_s2063" name="Acrobat Document" r:id="rId23" imgW="2742882" imgH="1919957" progId="AcroExch.Document.DC">
+                <p:oleObj spid="_x0000_s2131" name="Acrobat Document" r:id="rId19" imgW="2742882" imgH="1919957" progId="AcroExch.Document.DC">
+                  <p:embed/>
+                </p:oleObj>
+              </mc:Choice>
+              <mc:Fallback>
+                <p:oleObj name="Acrobat Document" r:id="rId19" imgW="2742882" imgH="1919957" progId="AcroExch.Document.DC">
+                  <p:embed/>
+                  <p:pic>
+                    <p:nvPicPr>
+                      <p:cNvPr id="0" name=""/>
+                      <p:cNvPicPr/>
+                      <p:nvPr/>
+                    </p:nvPicPr>
+                    <p:blipFill>
+                      <a:blip r:embed="rId20"/>
+                      <a:stretch>
+                        <a:fillRect/>
+                      </a:stretch>
+                    </p:blipFill>
+                    <p:spPr>
+                      <a:xfrm>
+                        <a:off x="33500947" y="19408376"/>
+                        <a:ext cx="9171162" cy="5040665"/>
+                      </a:xfrm>
+                      <a:prstGeom prst="rect">
+                        <a:avLst/>
+                      </a:prstGeom>
+                      <a:noFill/>
+                      <a:ln w="9525">
+                        <a:solidFill>
+                          <a:schemeClr val="tx1"/>
+                        </a:solidFill>
+                      </a:ln>
+                    </p:spPr>
+                  </p:pic>
+                </p:oleObj>
+              </mc:Fallback>
+            </mc:AlternateContent>
+          </a:graphicData>
+        </a:graphic>
+      </p:graphicFrame>
+      <p:graphicFrame>
+        <p:nvGraphicFramePr>
+          <p:cNvPr id="9" name="Object 8"/>
+          <p:cNvGraphicFramePr>
+            <a:graphicFrameLocks noChangeAspect="1"/>
+          </p:cNvGraphicFramePr>
+          <p:nvPr>
+            <p:extLst>
+              <p:ext uri="{D42A27DB-BD31-4B8C-83A1-F6EECF244321}">
+                <p14:modId xmlns:p14="http://schemas.microsoft.com/office/powerpoint/2010/main" val="3923770155"/>
+              </p:ext>
+            </p:extLst>
+          </p:nvPr>
+        </p:nvGraphicFramePr>
+        <p:xfrm>
+          <a:off x="33500947" y="26477937"/>
+          <a:ext cx="9171161" cy="5150779"/>
+        </p:xfrm>
+        <a:graphic>
+          <a:graphicData uri="http://schemas.openxmlformats.org/presentationml/2006/ole">
+            <mc:AlternateContent xmlns:mc="http://schemas.openxmlformats.org/markup-compatibility/2006">
+              <mc:Choice xmlns:v="urn:schemas-microsoft-com:vml" Requires="v">
+                <p:oleObj spid="_x0000_s2132" name="Acrobat Document" r:id="rId21" imgW="2742882" imgH="1919957" progId="AcroExch.Document.DC">
+                  <p:embed/>
+                </p:oleObj>
+              </mc:Choice>
+              <mc:Fallback>
+                <p:oleObj name="Acrobat Document" r:id="rId21" imgW="2742882" imgH="1919957" progId="AcroExch.Document.DC">
+                  <p:embed/>
+                  <p:pic>
+                    <p:nvPicPr>
+                      <p:cNvPr id="0" name=""/>
+                      <p:cNvPicPr/>
+                      <p:nvPr/>
+                    </p:nvPicPr>
+                    <p:blipFill>
+                      <a:blip r:embed="rId22"/>
+                      <a:stretch>
+                        <a:fillRect/>
+                      </a:stretch>
+                    </p:blipFill>
+                    <p:spPr>
+                      <a:xfrm>
+                        <a:off x="33500947" y="26477937"/>
+                        <a:ext cx="9171161" cy="5150779"/>
+                      </a:xfrm>
+                      <a:prstGeom prst="rect">
+                        <a:avLst/>
+                      </a:prstGeom>
+                      <a:noFill/>
+                      <a:ln w="9525">
+                        <a:solidFill>
+                          <a:schemeClr val="tx1"/>
+                        </a:solidFill>
+                      </a:ln>
+                    </p:spPr>
+                  </p:pic>
+                </p:oleObj>
+              </mc:Fallback>
+            </mc:AlternateContent>
+          </a:graphicData>
+        </a:graphic>
+      </p:graphicFrame>
+      <p:graphicFrame>
+        <p:nvGraphicFramePr>
+          <p:cNvPr id="7" name="Object 6"/>
+          <p:cNvGraphicFramePr>
+            <a:graphicFrameLocks noChangeAspect="1"/>
+          </p:cNvGraphicFramePr>
+          <p:nvPr>
+            <p:extLst>
+              <p:ext uri="{D42A27DB-BD31-4B8C-83A1-F6EECF244321}">
+                <p14:modId xmlns:p14="http://schemas.microsoft.com/office/powerpoint/2010/main" val="364593653"/>
+              </p:ext>
+            </p:extLst>
+          </p:nvPr>
+        </p:nvGraphicFramePr>
+        <p:xfrm>
+          <a:off x="22735977" y="25963430"/>
+          <a:ext cx="9316108" cy="5403769"/>
+        </p:xfrm>
+        <a:graphic>
+          <a:graphicData uri="http://schemas.openxmlformats.org/presentationml/2006/ole">
+            <mc:AlternateContent xmlns:mc="http://schemas.openxmlformats.org/markup-compatibility/2006">
+              <mc:Choice xmlns:v="urn:schemas-microsoft-com:vml" Requires="v">
+                <p:oleObj spid="_x0000_s2133" name="Acrobat Document" r:id="rId23" imgW="2742882" imgH="1919957" progId="AcroExch.Document.DC">
                   <p:embed/>
                 </p:oleObj>
               </mc:Choice>
@@ -6760,14 +6797,12 @@
                     <p:spPr>
                       <a:xfrm>
                         <a:off x="22735977" y="25963430"/>
-                        <a:ext cx="9328981" cy="5403769"/>
+                        <a:ext cx="9316108" cy="5403769"/>
                       </a:xfrm>
                       <a:prstGeom prst="rect">
                         <a:avLst/>
                       </a:prstGeom>
-                      <a:solidFill>
-                        <a:schemeClr val="tx1"/>
-                      </a:solidFill>
+                      <a:noFill/>
                       <a:ln w="9525">
                         <a:solidFill>
                           <a:schemeClr val="tx1"/>

</xml_diff>